<commit_message>
Add Vivien as speaker
</commit_message>
<xml_diff>
--- a/Locations/Ottawa/Welcome.pptx
+++ b/Locations/Ottawa/Welcome.pptx
@@ -5,7 +5,7 @@
     <p:sldMasterId id="2147483732" r:id="rId1"/>
   </p:sldMasterIdLst>
   <p:notesMasterIdLst>
-    <p:notesMasterId r:id="rId11"/>
+    <p:notesMasterId r:id="rId12"/>
   </p:notesMasterIdLst>
   <p:sldIdLst>
     <p:sldId id="642" r:id="rId2"/>
@@ -15,8 +15,9 @@
     <p:sldId id="647" r:id="rId6"/>
     <p:sldId id="651" r:id="rId7"/>
     <p:sldId id="649" r:id="rId8"/>
-    <p:sldId id="650" r:id="rId9"/>
-    <p:sldId id="648" r:id="rId10"/>
+    <p:sldId id="653" r:id="rId9"/>
+    <p:sldId id="650" r:id="rId10"/>
+    <p:sldId id="648" r:id="rId11"/>
   </p:sldIdLst>
   <p:sldSz cx="12192000" cy="6858000"/>
   <p:notesSz cx="7010400" cy="9296400"/>
@@ -127,6 +128,7 @@
             <p14:sldId id="647"/>
             <p14:sldId id="651"/>
             <p14:sldId id="649"/>
+            <p14:sldId id="653"/>
             <p14:sldId id="650"/>
             <p14:sldId id="648"/>
           </p14:sldIdLst>
@@ -234,7 +236,7 @@
           <a:p>
             <a:fld id="{9EB326D8-4C38-4835-91AB-B79CDC0B07B3}" type="datetimeFigureOut">
               <a:rPr lang="en-US" smtClean="0"/>
-              <a:t>2019-04-09</a:t>
+              <a:t>4/13/2019</a:t>
             </a:fld>
             <a:endParaRPr lang="en-US"/>
           </a:p>
@@ -734,7 +736,7 @@
           <a:p>
             <a:fld id="{2C52CFDC-D2D5-4B9F-BA75-89F771E01AEB}" type="slidenum">
               <a:rPr lang="en-US" smtClean="0"/>
-              <a:t>9</a:t>
+              <a:t>10</a:t>
             </a:fld>
             <a:endParaRPr lang="en-US"/>
           </a:p>
@@ -5632,7 +5634,7 @@
           <a:p>
             <a:fld id="{021C408F-DF0D-4580-9F48-C473147CA8AF}" type="datetimeFigureOut">
               <a:rPr lang="en-US" smtClean="0"/>
-              <a:t>2019-04-09</a:t>
+              <a:t>4/13/2019</a:t>
             </a:fld>
             <a:endParaRPr lang="en-US"/>
           </a:p>
@@ -6990,6 +6992,182 @@
     <p:extLst>
       <p:ext uri="{BB962C8B-B14F-4D97-AF65-F5344CB8AC3E}">
         <p14:creationId xmlns:p14="http://schemas.microsoft.com/office/powerpoint/2010/main" val="3451173612"/>
+      </p:ext>
+    </p:extLst>
+  </p:cSld>
+  <p:clrMapOvr>
+    <a:masterClrMapping/>
+  </p:clrMapOvr>
+  <p:transition>
+    <p:fade/>
+  </p:transition>
+</p:sld>
+</file>
+
+<file path=ppt/slides/slide10.xml><?xml version="1.0" encoding="utf-8"?>
+<p:sld xmlns:a="http://schemas.openxmlformats.org/drawingml/2006/main" xmlns:r="http://schemas.openxmlformats.org/officeDocument/2006/relationships" xmlns:p="http://schemas.openxmlformats.org/presentationml/2006/main">
+  <p:cSld>
+    <p:spTree>
+      <p:nvGrpSpPr>
+        <p:cNvPr id="1" name=""/>
+        <p:cNvGrpSpPr/>
+        <p:nvPr/>
+      </p:nvGrpSpPr>
+      <p:grpSpPr>
+        <a:xfrm>
+          <a:off x="0" y="0"/>
+          <a:ext cx="0" cy="0"/>
+          <a:chOff x="0" y="0"/>
+          <a:chExt cx="0" cy="0"/>
+        </a:xfrm>
+      </p:grpSpPr>
+      <p:sp>
+        <p:nvSpPr>
+          <p:cNvPr id="5" name="Text Placeholder 4"/>
+          <p:cNvSpPr>
+            <a:spLocks noGrp="1"/>
+          </p:cNvSpPr>
+          <p:nvPr>
+            <p:ph type="body" sz="quarter" idx="10"/>
+          </p:nvPr>
+        </p:nvSpPr>
+        <p:spPr>
+          <a:xfrm>
+            <a:off x="589800" y="1643449"/>
+            <a:ext cx="9310688" cy="5006377"/>
+          </a:xfrm>
+          <a:prstGeom prst="rect">
+            <a:avLst/>
+          </a:prstGeom>
+        </p:spPr>
+        <p:txBody>
+          <a:bodyPr/>
+          <a:lstStyle/>
+          <a:p>
+            <a:pPr marL="571500" indent="-571500">
+              <a:buFont typeface="Arial" panose="020B0604020202020204" pitchFamily="34" charset="0"/>
+              <a:buChar char="•"/>
+            </a:pPr>
+            <a:r>
+              <a:rPr lang="en-US" dirty="0">
+                <a:hlinkClick r:id="rId3"/>
+              </a:rPr>
+              <a:t>Get started with Azure</a:t>
+            </a:r>
+            <a:r>
+              <a:rPr lang="en-US" dirty="0"/>
+              <a:t>: https://docs.microsoft.com/en-us/azure/</a:t>
+            </a:r>
+          </a:p>
+          <a:p>
+            <a:pPr marL="571500" indent="-571500">
+              <a:buFont typeface="Arial" panose="020B0604020202020204" pitchFamily="34" charset="0"/>
+              <a:buChar char="•"/>
+            </a:pPr>
+            <a:endParaRPr lang="en-CA" dirty="0"/>
+          </a:p>
+          <a:p>
+            <a:pPr marL="571500" indent="-571500">
+              <a:buFont typeface="Arial" panose="020B0604020202020204" pitchFamily="34" charset="0"/>
+              <a:buChar char="•"/>
+            </a:pPr>
+            <a:r>
+              <a:rPr lang="en-CA" dirty="0">
+                <a:hlinkClick r:id="rId4"/>
+              </a:rPr>
+              <a:t>G</a:t>
+            </a:r>
+            <a:r>
+              <a:rPr lang="en-US" dirty="0" err="1">
+                <a:hlinkClick r:id="rId4"/>
+              </a:rPr>
+              <a:t>itHub</a:t>
+            </a:r>
+            <a:r>
+              <a:rPr lang="en-US" dirty="0">
+                <a:hlinkClick r:id="rId4"/>
+              </a:rPr>
+              <a:t> – Repository</a:t>
+            </a:r>
+            <a:r>
+              <a:rPr lang="en-US" dirty="0"/>
+              <a:t>: https://github.com/FBoucher/GlobalAzureBootcamp-2019</a:t>
+            </a:r>
+          </a:p>
+          <a:p>
+            <a:pPr marL="571500" indent="-571500">
+              <a:buFont typeface="Arial" panose="020B0604020202020204" pitchFamily="34" charset="0"/>
+              <a:buChar char="•"/>
+            </a:pPr>
+            <a:endParaRPr lang="en-US" dirty="0"/>
+          </a:p>
+          <a:p>
+            <a:pPr marL="571500" indent="-571500">
+              <a:buFont typeface="Arial" panose="020B0604020202020204" pitchFamily="34" charset="0"/>
+              <a:buChar char="•"/>
+            </a:pPr>
+            <a:endParaRPr lang="en-US" dirty="0"/>
+          </a:p>
+          <a:p>
+            <a:endParaRPr lang="en-US" dirty="0"/>
+          </a:p>
+          <a:p>
+            <a:endParaRPr lang="en-US" dirty="0"/>
+          </a:p>
+          <a:p>
+            <a:endParaRPr lang="en-US" dirty="0"/>
+          </a:p>
+          <a:p>
+            <a:endParaRPr lang="en-US" dirty="0"/>
+          </a:p>
+        </p:txBody>
+      </p:sp>
+      <p:sp>
+        <p:nvSpPr>
+          <p:cNvPr id="2" name="TextBox 1"/>
+          <p:cNvSpPr txBox="1"/>
+          <p:nvPr/>
+        </p:nvSpPr>
+        <p:spPr>
+          <a:xfrm>
+            <a:off x="589800" y="242596"/>
+            <a:ext cx="8684829" cy="1311128"/>
+          </a:xfrm>
+          <a:prstGeom prst="rect">
+            <a:avLst/>
+          </a:prstGeom>
+          <a:noFill/>
+        </p:spPr>
+        <p:txBody>
+          <a:bodyPr wrap="square" lIns="182880" tIns="146304" rIns="182880" bIns="146304" rtlCol="0">
+            <a:spAutoFit/>
+          </a:bodyPr>
+          <a:lstStyle/>
+          <a:p>
+            <a:r>
+              <a:rPr lang="en-US" sz="6600" dirty="0">
+                <a:solidFill>
+                  <a:schemeClr val="bg1"/>
+                </a:solidFill>
+                <a:latin typeface="+mj-lt"/>
+              </a:rPr>
+              <a:t>References</a:t>
+            </a:r>
+            <a:r>
+              <a:rPr lang="en-US" sz="6600" dirty="0">
+                <a:solidFill>
+                  <a:schemeClr val="bg1"/>
+                </a:solidFill>
+              </a:rPr>
+              <a:t>:</a:t>
+            </a:r>
+          </a:p>
+        </p:txBody>
+      </p:sp>
+    </p:spTree>
+    <p:extLst>
+      <p:ext uri="{BB962C8B-B14F-4D97-AF65-F5344CB8AC3E}">
+        <p14:creationId xmlns:p14="http://schemas.microsoft.com/office/powerpoint/2010/main" val="3271738797"/>
       </p:ext>
     </p:extLst>
   </p:cSld>
@@ -9637,6 +9815,503 @@
           <a:chExt cx="0" cy="0"/>
         </a:xfrm>
       </p:grpSpPr>
+      <p:sp>
+        <p:nvSpPr>
+          <p:cNvPr id="4" name="Title 4"/>
+          <p:cNvSpPr txBox="1">
+            <a:spLocks/>
+          </p:cNvSpPr>
+          <p:nvPr/>
+        </p:nvSpPr>
+        <p:spPr>
+          <a:xfrm>
+            <a:off x="344245" y="382364"/>
+            <a:ext cx="11034712" cy="1876425"/>
+          </a:xfrm>
+          <a:prstGeom prst="rect">
+            <a:avLst/>
+          </a:prstGeom>
+        </p:spPr>
+        <p:txBody>
+          <a:bodyPr>
+            <a:normAutofit/>
+          </a:bodyPr>
+          <a:lstStyle>
+            <a:lvl1pPr algn="l" defTabSz="914180" rtl="0" eaLnBrk="1" latinLnBrk="0" hangingPunct="1">
+              <a:lnSpc>
+                <a:spcPct val="90000"/>
+              </a:lnSpc>
+              <a:spcBef>
+                <a:spcPct val="0"/>
+              </a:spcBef>
+              <a:buNone/>
+              <a:defRPr lang="en-US" sz="5293" b="0" kern="1200" cap="none" spc="-100" baseline="0" dirty="0" smtClean="0">
+                <a:ln w="3175">
+                  <a:noFill/>
+                </a:ln>
+                <a:solidFill>
+                  <a:schemeClr val="bg1"/>
+                </a:solidFill>
+                <a:effectLst/>
+                <a:latin typeface="+mj-lt"/>
+                <a:ea typeface="+mn-ea"/>
+                <a:cs typeface="Segoe UI" pitchFamily="34" charset="0"/>
+              </a:defRPr>
+            </a:lvl1pPr>
+          </a:lstStyle>
+          <a:p>
+            <a:r>
+              <a:rPr lang="en-CA" sz="6600" dirty="0">
+                <a:solidFill>
+                  <a:schemeClr val="bg2"/>
+                </a:solidFill>
+              </a:rPr>
+              <a:t>Speakers</a:t>
+            </a:r>
+          </a:p>
+        </p:txBody>
+      </p:sp>
+      <p:sp>
+        <p:nvSpPr>
+          <p:cNvPr id="6" name="TextBox 5">
+            <a:extLst>
+              <a:ext uri="{FF2B5EF4-FFF2-40B4-BE49-F238E27FC236}">
+                <a16:creationId xmlns:a16="http://schemas.microsoft.com/office/drawing/2014/main" id="{5C2BCF1B-D436-4062-BDE8-8243B3F9F5BD}"/>
+              </a:ext>
+            </a:extLst>
+          </p:cNvPr>
+          <p:cNvSpPr txBox="1"/>
+          <p:nvPr/>
+        </p:nvSpPr>
+        <p:spPr>
+          <a:xfrm>
+            <a:off x="8681580" y="6475636"/>
+            <a:ext cx="5394754" cy="433965"/>
+          </a:xfrm>
+          <a:prstGeom prst="rect">
+            <a:avLst/>
+          </a:prstGeom>
+          <a:noFill/>
+        </p:spPr>
+        <p:txBody>
+          <a:bodyPr wrap="square" lIns="182880" tIns="146304" rIns="182880" bIns="146304" rtlCol="0">
+            <a:spAutoFit/>
+          </a:bodyPr>
+          <a:lstStyle/>
+          <a:p>
+            <a:r>
+              <a:rPr lang="en-US" sz="900" dirty="0">
+                <a:hlinkClick r:id="rId2" tooltip="http://www.slenquirer.com/2012/11/sle-promotes-healthy-eating-despite.html"/>
+              </a:rPr>
+              <a:t>This Photo</a:t>
+            </a:r>
+            <a:r>
+              <a:rPr lang="en-US" sz="900" dirty="0"/>
+              <a:t> by Unknown Author is licensed under </a:t>
+            </a:r>
+            <a:r>
+              <a:rPr lang="en-US" sz="900" dirty="0">
+                <a:hlinkClick r:id="rId3" tooltip="https://creativecommons.org/licenses/by-nc-sa/3.0/"/>
+              </a:rPr>
+              <a:t>CC BY-SA-NC</a:t>
+            </a:r>
+            <a:endParaRPr lang="en-US" sz="900" dirty="0"/>
+          </a:p>
+        </p:txBody>
+      </p:sp>
+      <p:sp>
+        <p:nvSpPr>
+          <p:cNvPr id="12" name="TextBox 11">
+            <a:extLst>
+              <a:ext uri="{FF2B5EF4-FFF2-40B4-BE49-F238E27FC236}">
+                <a16:creationId xmlns:a16="http://schemas.microsoft.com/office/drawing/2014/main" id="{85971E54-AD77-44C6-B148-6B5A1E057996}"/>
+              </a:ext>
+            </a:extLst>
+          </p:cNvPr>
+          <p:cNvSpPr txBox="1"/>
+          <p:nvPr/>
+        </p:nvSpPr>
+        <p:spPr>
+          <a:xfrm>
+            <a:off x="763348" y="4053280"/>
+            <a:ext cx="3546389" cy="627864"/>
+          </a:xfrm>
+          <a:prstGeom prst="rect">
+            <a:avLst/>
+          </a:prstGeom>
+          <a:noFill/>
+        </p:spPr>
+        <p:txBody>
+          <a:bodyPr wrap="square" lIns="182880" tIns="146304" rIns="182880" bIns="146304" rtlCol="0">
+            <a:spAutoFit/>
+          </a:bodyPr>
+          <a:lstStyle/>
+          <a:p>
+            <a:pPr>
+              <a:lnSpc>
+                <a:spcPct val="90000"/>
+              </a:lnSpc>
+              <a:spcAft>
+                <a:spcPts val="600"/>
+              </a:spcAft>
+            </a:pPr>
+            <a:r>
+              <a:rPr lang="en-CA" sz="2400" b="1" dirty="0">
+                <a:solidFill>
+                  <a:schemeClr val="bg1"/>
+                </a:solidFill>
+              </a:rPr>
+              <a:t>Vivien Chevallier</a:t>
+            </a:r>
+            <a:endParaRPr lang="en-US" sz="2400" b="1" dirty="0" err="1">
+              <a:solidFill>
+                <a:schemeClr val="bg1"/>
+              </a:solidFill>
+            </a:endParaRPr>
+          </a:p>
+        </p:txBody>
+      </p:sp>
+      <p:sp>
+        <p:nvSpPr>
+          <p:cNvPr id="13" name="TextBox 12">
+            <a:extLst>
+              <a:ext uri="{FF2B5EF4-FFF2-40B4-BE49-F238E27FC236}">
+                <a16:creationId xmlns:a16="http://schemas.microsoft.com/office/drawing/2014/main" id="{89F31CCD-2949-408C-B72D-47E1F1F8FA71}"/>
+              </a:ext>
+            </a:extLst>
+          </p:cNvPr>
+          <p:cNvSpPr txBox="1"/>
+          <p:nvPr/>
+        </p:nvSpPr>
+        <p:spPr>
+          <a:xfrm>
+            <a:off x="763348" y="4617493"/>
+            <a:ext cx="4996517" cy="1037207"/>
+          </a:xfrm>
+          <a:prstGeom prst="rect">
+            <a:avLst/>
+          </a:prstGeom>
+          <a:noFill/>
+        </p:spPr>
+        <p:txBody>
+          <a:bodyPr wrap="square" lIns="182880" tIns="146304" rIns="182880" bIns="146304" rtlCol="0">
+            <a:spAutoFit/>
+          </a:bodyPr>
+          <a:lstStyle/>
+          <a:p>
+            <a:pPr>
+              <a:lnSpc>
+                <a:spcPct val="90000"/>
+              </a:lnSpc>
+              <a:spcAft>
+                <a:spcPts val="600"/>
+              </a:spcAft>
+            </a:pPr>
+            <a:r>
+              <a:rPr lang="en-CA" sz="2400" dirty="0">
+                <a:solidFill>
+                  <a:schemeClr val="bg1"/>
+                </a:solidFill>
+              </a:rPr>
+              <a:t>Twitter: </a:t>
+            </a:r>
+            <a:r>
+              <a:rPr lang="en-CA" sz="2400" dirty="0">
+                <a:solidFill>
+                  <a:schemeClr val="bg1"/>
+                </a:solidFill>
+                <a:hlinkClick r:id="rId4"/>
+              </a:rPr>
+              <a:t>vchevallier</a:t>
+            </a:r>
+            <a:endParaRPr lang="en-CA" sz="2400" dirty="0">
+              <a:solidFill>
+                <a:schemeClr val="bg1"/>
+              </a:solidFill>
+            </a:endParaRPr>
+          </a:p>
+          <a:p>
+            <a:pPr>
+              <a:lnSpc>
+                <a:spcPct val="90000"/>
+              </a:lnSpc>
+              <a:spcAft>
+                <a:spcPts val="600"/>
+              </a:spcAft>
+            </a:pPr>
+            <a:r>
+              <a:rPr lang="en-CA" sz="2400" dirty="0">
+                <a:solidFill>
+                  <a:schemeClr val="bg1"/>
+                </a:solidFill>
+              </a:rPr>
+              <a:t>Blog: 	  </a:t>
+            </a:r>
+            <a:r>
+              <a:rPr lang="en-CA" sz="2400" dirty="0">
+                <a:solidFill>
+                  <a:schemeClr val="bg1"/>
+                </a:solidFill>
+                <a:hlinkClick r:id="rId5"/>
+              </a:rPr>
+              <a:t>www.vivien-chevallier.com</a:t>
+            </a:r>
+            <a:endParaRPr lang="en-CA" sz="2400" dirty="0">
+              <a:solidFill>
+                <a:schemeClr val="bg1"/>
+              </a:solidFill>
+            </a:endParaRPr>
+          </a:p>
+        </p:txBody>
+      </p:sp>
+      <p:pic>
+        <p:nvPicPr>
+          <p:cNvPr id="14" name="Picture 13">
+            <a:extLst>
+              <a:ext uri="{FF2B5EF4-FFF2-40B4-BE49-F238E27FC236}">
+                <a16:creationId xmlns:a16="http://schemas.microsoft.com/office/drawing/2014/main" id="{BBDA2106-596F-47CD-A5B0-7B7626A220FC}"/>
+              </a:ext>
+            </a:extLst>
+          </p:cNvPr>
+          <p:cNvPicPr>
+            <a:picLocks noChangeAspect="1"/>
+          </p:cNvPicPr>
+          <p:nvPr/>
+        </p:nvPicPr>
+        <p:blipFill>
+          <a:blip r:embed="rId6">
+            <a:extLst>
+              <a:ext uri="{28A0092B-C50C-407E-A947-70E740481C1C}">
+                <a14:useLocalDpi xmlns:a14="http://schemas.microsoft.com/office/drawing/2010/main" val="0"/>
+              </a:ext>
+              <a:ext uri="{837473B0-CC2E-450A-ABE3-18F120FF3D39}">
+                <a1611:picAttrSrcUrl xmlns:a1611="http://schemas.microsoft.com/office/drawing/2016/11/main" r:id="rId2"/>
+              </a:ext>
+            </a:extLst>
+          </a:blip>
+          <a:stretch>
+            <a:fillRect/>
+          </a:stretch>
+        </p:blipFill>
+        <p:spPr>
+          <a:xfrm>
+            <a:off x="6830589" y="1517232"/>
+            <a:ext cx="2601735" cy="2462976"/>
+          </a:xfrm>
+          <a:prstGeom prst="rect">
+            <a:avLst/>
+          </a:prstGeom>
+        </p:spPr>
+      </p:pic>
+      <p:sp>
+        <p:nvSpPr>
+          <p:cNvPr id="15" name="TextBox 14">
+            <a:extLst>
+              <a:ext uri="{FF2B5EF4-FFF2-40B4-BE49-F238E27FC236}">
+                <a16:creationId xmlns:a16="http://schemas.microsoft.com/office/drawing/2014/main" id="{85D7B070-0B80-4B92-81B9-E115FB94A0F2}"/>
+              </a:ext>
+            </a:extLst>
+          </p:cNvPr>
+          <p:cNvSpPr txBox="1"/>
+          <p:nvPr/>
+        </p:nvSpPr>
+        <p:spPr>
+          <a:xfrm>
+            <a:off x="6627340" y="3980208"/>
+            <a:ext cx="3546389" cy="627864"/>
+          </a:xfrm>
+          <a:prstGeom prst="rect">
+            <a:avLst/>
+          </a:prstGeom>
+          <a:noFill/>
+        </p:spPr>
+        <p:txBody>
+          <a:bodyPr wrap="square" lIns="182880" tIns="146304" rIns="182880" bIns="146304" rtlCol="0">
+            <a:spAutoFit/>
+          </a:bodyPr>
+          <a:lstStyle/>
+          <a:p>
+            <a:pPr>
+              <a:lnSpc>
+                <a:spcPct val="90000"/>
+              </a:lnSpc>
+              <a:spcAft>
+                <a:spcPts val="600"/>
+              </a:spcAft>
+            </a:pPr>
+            <a:r>
+              <a:rPr lang="en-CA" sz="2400" b="1" dirty="0">
+                <a:solidFill>
+                  <a:schemeClr val="bg1"/>
+                </a:solidFill>
+              </a:rPr>
+              <a:t>John Doe</a:t>
+            </a:r>
+            <a:endParaRPr lang="en-US" sz="2400" b="1" dirty="0" err="1">
+              <a:solidFill>
+                <a:schemeClr val="bg1"/>
+              </a:solidFill>
+            </a:endParaRPr>
+          </a:p>
+        </p:txBody>
+      </p:sp>
+      <p:sp>
+        <p:nvSpPr>
+          <p:cNvPr id="16" name="TextBox 15">
+            <a:extLst>
+              <a:ext uri="{FF2B5EF4-FFF2-40B4-BE49-F238E27FC236}">
+                <a16:creationId xmlns:a16="http://schemas.microsoft.com/office/drawing/2014/main" id="{ED9169BA-311E-4F62-B0D5-3CA1ABA7C549}"/>
+              </a:ext>
+            </a:extLst>
+          </p:cNvPr>
+          <p:cNvSpPr txBox="1"/>
+          <p:nvPr/>
+        </p:nvSpPr>
+        <p:spPr>
+          <a:xfrm>
+            <a:off x="6627340" y="4617493"/>
+            <a:ext cx="3343140" cy="1446550"/>
+          </a:xfrm>
+          <a:prstGeom prst="rect">
+            <a:avLst/>
+          </a:prstGeom>
+          <a:noFill/>
+        </p:spPr>
+        <p:txBody>
+          <a:bodyPr wrap="square" lIns="182880" tIns="146304" rIns="182880" bIns="146304" rtlCol="0">
+            <a:spAutoFit/>
+          </a:bodyPr>
+          <a:lstStyle/>
+          <a:p>
+            <a:pPr>
+              <a:lnSpc>
+                <a:spcPct val="90000"/>
+              </a:lnSpc>
+              <a:spcAft>
+                <a:spcPts val="600"/>
+              </a:spcAft>
+            </a:pPr>
+            <a:r>
+              <a:rPr lang="en-CA" sz="2400" dirty="0">
+                <a:solidFill>
+                  <a:schemeClr val="bg1"/>
+                </a:solidFill>
+              </a:rPr>
+              <a:t>Twitter:</a:t>
+            </a:r>
+          </a:p>
+          <a:p>
+            <a:pPr>
+              <a:lnSpc>
+                <a:spcPct val="90000"/>
+              </a:lnSpc>
+              <a:spcAft>
+                <a:spcPts val="600"/>
+              </a:spcAft>
+            </a:pPr>
+            <a:r>
+              <a:rPr lang="en-CA" sz="2400" dirty="0">
+                <a:solidFill>
+                  <a:schemeClr val="bg1"/>
+                </a:solidFill>
+              </a:rPr>
+              <a:t>Blog: </a:t>
+            </a:r>
+          </a:p>
+          <a:p>
+            <a:pPr>
+              <a:lnSpc>
+                <a:spcPct val="90000"/>
+              </a:lnSpc>
+              <a:spcAft>
+                <a:spcPts val="600"/>
+              </a:spcAft>
+            </a:pPr>
+            <a:r>
+              <a:rPr lang="en-CA" sz="2400" dirty="0">
+                <a:solidFill>
+                  <a:schemeClr val="bg1"/>
+                </a:solidFill>
+              </a:rPr>
+              <a:t>Other:</a:t>
+            </a:r>
+            <a:endParaRPr lang="en-US" sz="2400" dirty="0" err="1">
+              <a:solidFill>
+                <a:schemeClr val="bg1"/>
+              </a:solidFill>
+            </a:endParaRPr>
+          </a:p>
+        </p:txBody>
+      </p:sp>
+      <p:pic>
+        <p:nvPicPr>
+          <p:cNvPr id="3" name="Picture 2">
+            <a:extLst>
+              <a:ext uri="{FF2B5EF4-FFF2-40B4-BE49-F238E27FC236}">
+                <a16:creationId xmlns:a16="http://schemas.microsoft.com/office/drawing/2014/main" id="{AFAE5FDB-767C-4D0B-B59B-CF914BAA4E2A}"/>
+              </a:ext>
+            </a:extLst>
+          </p:cNvPr>
+          <p:cNvPicPr>
+            <a:picLocks noChangeAspect="1"/>
+          </p:cNvPicPr>
+          <p:nvPr/>
+        </p:nvPicPr>
+        <p:blipFill>
+          <a:blip r:embed="rId7" cstate="print">
+            <a:extLst>
+              <a:ext uri="{28A0092B-C50C-407E-A947-70E740481C1C}">
+                <a14:useLocalDpi xmlns:a14="http://schemas.microsoft.com/office/drawing/2010/main" val="0"/>
+              </a:ext>
+            </a:extLst>
+          </a:blip>
+          <a:stretch>
+            <a:fillRect/>
+          </a:stretch>
+        </p:blipFill>
+        <p:spPr>
+          <a:xfrm>
+            <a:off x="1021939" y="1628886"/>
+            <a:ext cx="2239667" cy="2239667"/>
+          </a:xfrm>
+          <a:prstGeom prst="rect">
+            <a:avLst/>
+          </a:prstGeom>
+        </p:spPr>
+      </p:pic>
+    </p:spTree>
+    <p:extLst>
+      <p:ext uri="{BB962C8B-B14F-4D97-AF65-F5344CB8AC3E}">
+        <p14:creationId xmlns:p14="http://schemas.microsoft.com/office/powerpoint/2010/main" val="2358335946"/>
+      </p:ext>
+    </p:extLst>
+  </p:cSld>
+  <p:clrMapOvr>
+    <a:masterClrMapping/>
+  </p:clrMapOvr>
+  <p:transition>
+    <p:fade/>
+  </p:transition>
+</p:sld>
+</file>
+
+<file path=ppt/slides/slide9.xml><?xml version="1.0" encoding="utf-8"?>
+<p:sld xmlns:a="http://schemas.openxmlformats.org/drawingml/2006/main" xmlns:r="http://schemas.openxmlformats.org/officeDocument/2006/relationships" xmlns:p="http://schemas.openxmlformats.org/presentationml/2006/main">
+  <p:cSld>
+    <p:spTree>
+      <p:nvGrpSpPr>
+        <p:cNvPr id="1" name=""/>
+        <p:cNvGrpSpPr/>
+        <p:nvPr/>
+      </p:nvGrpSpPr>
+      <p:grpSpPr>
+        <a:xfrm>
+          <a:off x="0" y="0"/>
+          <a:ext cx="0" cy="0"/>
+          <a:chOff x="0" y="0"/>
+          <a:chExt cx="0" cy="0"/>
+        </a:xfrm>
+      </p:grpSpPr>
       <p:pic>
         <p:nvPicPr>
           <p:cNvPr id="1026" name="Picture 2" descr="https://lh3.googleusercontent.com/jFbz8dCsUsy8hbvwNNkfDOrTH6FYWns5DzmTM1wHovBRvqRmS1owruXZ2jkahQbWexwZoyoqxi83pnwUkf4hORBAgn2FOMn4_xbD4NNinCJOiasYFGBZ3X8VTf3bQcllLNKRQjxgZ55zDABou-YyddJ0r0qJorLH-AEYcN8K1Lfzu2bnAWKwMe3klZnjez7OTSyn4Yn1CD0mcadMI_ToG18RaKIrODHceF48W1u1wWIwri4JYOicVNaCoYRohALgN6cGbrRao7BvSvvQJqQjELQ_4acNnzFoIe7DsEcK2JSW8UYVyfak4V6SH0GDZZOaXex4q-zsOdg0V18oRsHZ5yZg6J1QfZOtMOxvBqw1a-6yG7U3SwUXYnnYUtludbwQWXw1JeQRg0eVgGtU4uKKP_8lUKahw2fZVQe-s3fELqgAY4QSuAGAJEsYpYsqSBjkq8BESrlLUd_kOZ26_inA_mZoFOmDQixQ1AMjlIYXsCoA0N3MPnwaB8pQzNqcUyQhkwgYytfoE4bKBhtzg3-gdHd6-YMpr_CqfDJO2IYZ0fRdwkCxNs4u0YpxpjcPRjeNEpn0_schcxvahNyGQP42_pTprKmCHE_eHcsxW8-Ikf9mQYsuLnykC3rC5fVjjv_VK-fLqM2IJtAOakNJ3pr89RDZlOe9k8Z2=w980-h735-no">
@@ -9735,182 +10410,6 @@
     <p:extLst>
       <p:ext uri="{BB962C8B-B14F-4D97-AF65-F5344CB8AC3E}">
         <p14:creationId xmlns:p14="http://schemas.microsoft.com/office/powerpoint/2010/main" val="3616890338"/>
-      </p:ext>
-    </p:extLst>
-  </p:cSld>
-  <p:clrMapOvr>
-    <a:masterClrMapping/>
-  </p:clrMapOvr>
-  <p:transition>
-    <p:fade/>
-  </p:transition>
-</p:sld>
-</file>
-
-<file path=ppt/slides/slide9.xml><?xml version="1.0" encoding="utf-8"?>
-<p:sld xmlns:a="http://schemas.openxmlformats.org/drawingml/2006/main" xmlns:r="http://schemas.openxmlformats.org/officeDocument/2006/relationships" xmlns:p="http://schemas.openxmlformats.org/presentationml/2006/main">
-  <p:cSld>
-    <p:spTree>
-      <p:nvGrpSpPr>
-        <p:cNvPr id="1" name=""/>
-        <p:cNvGrpSpPr/>
-        <p:nvPr/>
-      </p:nvGrpSpPr>
-      <p:grpSpPr>
-        <a:xfrm>
-          <a:off x="0" y="0"/>
-          <a:ext cx="0" cy="0"/>
-          <a:chOff x="0" y="0"/>
-          <a:chExt cx="0" cy="0"/>
-        </a:xfrm>
-      </p:grpSpPr>
-      <p:sp>
-        <p:nvSpPr>
-          <p:cNvPr id="5" name="Text Placeholder 4"/>
-          <p:cNvSpPr>
-            <a:spLocks noGrp="1"/>
-          </p:cNvSpPr>
-          <p:nvPr>
-            <p:ph type="body" sz="quarter" idx="10"/>
-          </p:nvPr>
-        </p:nvSpPr>
-        <p:spPr>
-          <a:xfrm>
-            <a:off x="589800" y="1643449"/>
-            <a:ext cx="9310688" cy="5006377"/>
-          </a:xfrm>
-          <a:prstGeom prst="rect">
-            <a:avLst/>
-          </a:prstGeom>
-        </p:spPr>
-        <p:txBody>
-          <a:bodyPr/>
-          <a:lstStyle/>
-          <a:p>
-            <a:pPr marL="571500" indent="-571500">
-              <a:buFont typeface="Arial" panose="020B0604020202020204" pitchFamily="34" charset="0"/>
-              <a:buChar char="•"/>
-            </a:pPr>
-            <a:r>
-              <a:rPr lang="en-US" dirty="0">
-                <a:hlinkClick r:id="rId3"/>
-              </a:rPr>
-              <a:t>Get started with Azure</a:t>
-            </a:r>
-            <a:r>
-              <a:rPr lang="en-US" dirty="0"/>
-              <a:t>: https://docs.microsoft.com/en-us/azure/</a:t>
-            </a:r>
-          </a:p>
-          <a:p>
-            <a:pPr marL="571500" indent="-571500">
-              <a:buFont typeface="Arial" panose="020B0604020202020204" pitchFamily="34" charset="0"/>
-              <a:buChar char="•"/>
-            </a:pPr>
-            <a:endParaRPr lang="en-CA" dirty="0"/>
-          </a:p>
-          <a:p>
-            <a:pPr marL="571500" indent="-571500">
-              <a:buFont typeface="Arial" panose="020B0604020202020204" pitchFamily="34" charset="0"/>
-              <a:buChar char="•"/>
-            </a:pPr>
-            <a:r>
-              <a:rPr lang="en-CA" dirty="0">
-                <a:hlinkClick r:id="rId4"/>
-              </a:rPr>
-              <a:t>G</a:t>
-            </a:r>
-            <a:r>
-              <a:rPr lang="en-US" dirty="0" err="1">
-                <a:hlinkClick r:id="rId4"/>
-              </a:rPr>
-              <a:t>itHub</a:t>
-            </a:r>
-            <a:r>
-              <a:rPr lang="en-US" dirty="0">
-                <a:hlinkClick r:id="rId4"/>
-              </a:rPr>
-              <a:t> – Repository</a:t>
-            </a:r>
-            <a:r>
-              <a:rPr lang="en-US" dirty="0"/>
-              <a:t>: https://github.com/FBoucher/GlobalAzureBootcamp-2019</a:t>
-            </a:r>
-          </a:p>
-          <a:p>
-            <a:pPr marL="571500" indent="-571500">
-              <a:buFont typeface="Arial" panose="020B0604020202020204" pitchFamily="34" charset="0"/>
-              <a:buChar char="•"/>
-            </a:pPr>
-            <a:endParaRPr lang="en-US" dirty="0"/>
-          </a:p>
-          <a:p>
-            <a:pPr marL="571500" indent="-571500">
-              <a:buFont typeface="Arial" panose="020B0604020202020204" pitchFamily="34" charset="0"/>
-              <a:buChar char="•"/>
-            </a:pPr>
-            <a:endParaRPr lang="en-US" dirty="0"/>
-          </a:p>
-          <a:p>
-            <a:endParaRPr lang="en-US" dirty="0"/>
-          </a:p>
-          <a:p>
-            <a:endParaRPr lang="en-US" dirty="0"/>
-          </a:p>
-          <a:p>
-            <a:endParaRPr lang="en-US" dirty="0"/>
-          </a:p>
-          <a:p>
-            <a:endParaRPr lang="en-US" dirty="0"/>
-          </a:p>
-        </p:txBody>
-      </p:sp>
-      <p:sp>
-        <p:nvSpPr>
-          <p:cNvPr id="2" name="TextBox 1"/>
-          <p:cNvSpPr txBox="1"/>
-          <p:nvPr/>
-        </p:nvSpPr>
-        <p:spPr>
-          <a:xfrm>
-            <a:off x="589800" y="242596"/>
-            <a:ext cx="8684829" cy="1311128"/>
-          </a:xfrm>
-          <a:prstGeom prst="rect">
-            <a:avLst/>
-          </a:prstGeom>
-          <a:noFill/>
-        </p:spPr>
-        <p:txBody>
-          <a:bodyPr wrap="square" lIns="182880" tIns="146304" rIns="182880" bIns="146304" rtlCol="0">
-            <a:spAutoFit/>
-          </a:bodyPr>
-          <a:lstStyle/>
-          <a:p>
-            <a:r>
-              <a:rPr lang="en-US" sz="6600" dirty="0">
-                <a:solidFill>
-                  <a:schemeClr val="bg1"/>
-                </a:solidFill>
-                <a:latin typeface="+mj-lt"/>
-              </a:rPr>
-              <a:t>References</a:t>
-            </a:r>
-            <a:r>
-              <a:rPr lang="en-US" sz="6600" dirty="0">
-                <a:solidFill>
-                  <a:schemeClr val="bg1"/>
-                </a:solidFill>
-              </a:rPr>
-              <a:t>:</a:t>
-            </a:r>
-          </a:p>
-        </p:txBody>
-      </p:sp>
-    </p:spTree>
-    <p:extLst>
-      <p:ext uri="{BB962C8B-B14F-4D97-AF65-F5344CB8AC3E}">
-        <p14:creationId xmlns:p14="http://schemas.microsoft.com/office/powerpoint/2010/main" val="3271738797"/>
       </p:ext>
     </p:extLst>
   </p:cSld>

</xml_diff>

<commit_message>
Add Carl-Hugo to Ottawa pptx
</commit_message>
<xml_diff>
--- a/Locations/Ottawa/Welcome.pptx
+++ b/Locations/Ottawa/Welcome.pptx
@@ -5,7 +5,7 @@
     <p:sldMasterId id="2147483732" r:id="rId1"/>
   </p:sldMasterIdLst>
   <p:notesMasterIdLst>
-    <p:notesMasterId r:id="rId12"/>
+    <p:notesMasterId r:id="rId13"/>
   </p:notesMasterIdLst>
   <p:sldIdLst>
     <p:sldId id="642" r:id="rId2"/>
@@ -16,8 +16,9 @@
     <p:sldId id="651" r:id="rId7"/>
     <p:sldId id="649" r:id="rId8"/>
     <p:sldId id="653" r:id="rId9"/>
-    <p:sldId id="650" r:id="rId10"/>
-    <p:sldId id="648" r:id="rId11"/>
+    <p:sldId id="654" r:id="rId10"/>
+    <p:sldId id="650" r:id="rId11"/>
+    <p:sldId id="648" r:id="rId12"/>
   </p:sldIdLst>
   <p:sldSz cx="12192000" cy="6858000"/>
   <p:notesSz cx="7010400" cy="9296400"/>
@@ -129,6 +130,7 @@
             <p14:sldId id="651"/>
             <p14:sldId id="649"/>
             <p14:sldId id="653"/>
+            <p14:sldId id="654"/>
             <p14:sldId id="650"/>
             <p14:sldId id="648"/>
           </p14:sldIdLst>
@@ -236,7 +238,7 @@
           <a:p>
             <a:fld id="{9EB326D8-4C38-4835-91AB-B79CDC0B07B3}" type="datetimeFigureOut">
               <a:rPr lang="en-US" smtClean="0"/>
-              <a:t>4/13/2019</a:t>
+              <a:t>4/26/2019</a:t>
             </a:fld>
             <a:endParaRPr lang="en-US"/>
           </a:p>
@@ -736,7 +738,7 @@
           <a:p>
             <a:fld id="{2C52CFDC-D2D5-4B9F-BA75-89F771E01AEB}" type="slidenum">
               <a:rPr lang="en-US" smtClean="0"/>
-              <a:t>10</a:t>
+              <a:t>11</a:t>
             </a:fld>
             <a:endParaRPr lang="en-US"/>
           </a:p>
@@ -5634,7 +5636,7 @@
           <a:p>
             <a:fld id="{021C408F-DF0D-4580-9F48-C473147CA8AF}" type="datetimeFigureOut">
               <a:rPr lang="en-US" smtClean="0"/>
-              <a:t>4/13/2019</a:t>
+              <a:t>4/26/2019</a:t>
             </a:fld>
             <a:endParaRPr lang="en-US"/>
           </a:p>
@@ -7005,6 +7007,133 @@
 </file>
 
 <file path=ppt/slides/slide10.xml><?xml version="1.0" encoding="utf-8"?>
+<p:sld xmlns:a="http://schemas.openxmlformats.org/drawingml/2006/main" xmlns:r="http://schemas.openxmlformats.org/officeDocument/2006/relationships" xmlns:p="http://schemas.openxmlformats.org/presentationml/2006/main">
+  <p:cSld>
+    <p:spTree>
+      <p:nvGrpSpPr>
+        <p:cNvPr id="1" name=""/>
+        <p:cNvGrpSpPr/>
+        <p:nvPr/>
+      </p:nvGrpSpPr>
+      <p:grpSpPr>
+        <a:xfrm>
+          <a:off x="0" y="0"/>
+          <a:ext cx="0" cy="0"/>
+          <a:chOff x="0" y="0"/>
+          <a:chExt cx="0" cy="0"/>
+        </a:xfrm>
+      </p:grpSpPr>
+      <p:pic>
+        <p:nvPicPr>
+          <p:cNvPr id="1026" name="Picture 2" descr="https://lh3.googleusercontent.com/jFbz8dCsUsy8hbvwNNkfDOrTH6FYWns5DzmTM1wHovBRvqRmS1owruXZ2jkahQbWexwZoyoqxi83pnwUkf4hORBAgn2FOMn4_xbD4NNinCJOiasYFGBZ3X8VTf3bQcllLNKRQjxgZ55zDABou-YyddJ0r0qJorLH-AEYcN8K1Lfzu2bnAWKwMe3klZnjez7OTSyn4Yn1CD0mcadMI_ToG18RaKIrODHceF48W1u1wWIwri4JYOicVNaCoYRohALgN6cGbrRao7BvSvvQJqQjELQ_4acNnzFoIe7DsEcK2JSW8UYVyfak4V6SH0GDZZOaXex4q-zsOdg0V18oRsHZ5yZg6J1QfZOtMOxvBqw1a-6yG7U3SwUXYnnYUtludbwQWXw1JeQRg0eVgGtU4uKKP_8lUKahw2fZVQe-s3fELqgAY4QSuAGAJEsYpYsqSBjkq8BESrlLUd_kOZ26_inA_mZoFOmDQixQ1AMjlIYXsCoA0N3MPnwaB8pQzNqcUyQhkwgYytfoE4bKBhtzg3-gdHd6-YMpr_CqfDJO2IYZ0fRdwkCxNs4u0YpxpjcPRjeNEpn0_schcxvahNyGQP42_pTprKmCHE_eHcsxW8-Ikf9mQYsuLnykC3rC5fVjjv_VK-fLqM2IJtAOakNJ3pr89RDZlOe9k8Z2=w980-h735-no">
+            <a:extLst>
+              <a:ext uri="{FF2B5EF4-FFF2-40B4-BE49-F238E27FC236}">
+                <a16:creationId xmlns:a16="http://schemas.microsoft.com/office/drawing/2014/main" id="{48638A12-BB87-4EBC-AA83-483B1AA6E1C9}"/>
+              </a:ext>
+            </a:extLst>
+          </p:cNvPr>
+          <p:cNvPicPr>
+            <a:picLocks noChangeAspect="1" noChangeArrowheads="1"/>
+          </p:cNvPicPr>
+          <p:nvPr/>
+        </p:nvPicPr>
+        <p:blipFill>
+          <a:blip r:embed="rId2">
+            <a:extLst>
+              <a:ext uri="{28A0092B-C50C-407E-A947-70E740481C1C}">
+                <a14:useLocalDpi xmlns:a14="http://schemas.microsoft.com/office/drawing/2010/main" val="0"/>
+              </a:ext>
+            </a:extLst>
+          </a:blip>
+          <a:srcRect/>
+          <a:stretch>
+            <a:fillRect/>
+          </a:stretch>
+        </p:blipFill>
+        <p:spPr bwMode="auto">
+          <a:xfrm>
+            <a:off x="6529097" y="293365"/>
+            <a:ext cx="5330139" cy="3997604"/>
+          </a:xfrm>
+          <a:prstGeom prst="rect">
+            <a:avLst/>
+          </a:prstGeom>
+          <a:noFill/>
+          <a:extLst>
+            <a:ext uri="{909E8E84-426E-40DD-AFC4-6F175D3DCCD1}">
+              <a14:hiddenFill xmlns:a14="http://schemas.microsoft.com/office/drawing/2010/main">
+                <a:solidFill>
+                  <a:srgbClr val="FFFFFF"/>
+                </a:solidFill>
+              </a14:hiddenFill>
+            </a:ext>
+          </a:extLst>
+        </p:spPr>
+      </p:pic>
+      <p:pic>
+        <p:nvPicPr>
+          <p:cNvPr id="1028" name="Picture 4" descr="https://lh3.googleusercontent.com/ysql-HDtaZYsXX48TXavonK4X01hwPXLbkSlSQZ4LdgN6o1sTHbl6NW0A9hKPN_bHV9NnKAcGnFTLBmCiiNv0NanEXNVhruCBVe-84519ZRhBL9BpfVVZBnoHzpCdr6wRXWWvthJfRDomELs_2bkPv3FhRpx8H4y7VPckTPtcli-sin2LuXcj2xNH5F--bJKgnEXOMdejLzEwoPR0hfU4Y5QD82mh3i8aXjsI0K4Nd1LXxIScgI5C3ADM15ctBxX13kvOJVS2yuchs3ynta61UKU4XomK6-Omw94QVKNHI_7gKMu3EH0ndTIo9uVycERPUofp-L46qGTOZHLAmDWg4Tune_-2iPUi9Yo1gxmcX5u4Ql97GhfuZfaA0-Yd84v1HvQ7BarukAznxG9ecTwxBlHar0OKQ4fc4nnNU0dpz97HZMtOob4xrQ3jiykb55j5gxE7IC-XuGXgBIXuhLgRJ8oNbNUpN-9ZWTP40NdCzhaLJzoTRcwxZN2Jhw0x7Fof34TwpEMMEn071AjleByCOiJlHxL1mCLtTgxj2qj-rXV6uZye0GwNQMqGjBCAdUe7VYafc-pM07DxLHTxtHCXrKhVg43G_mrrdNe2jclthbCve2lQjPfu2SUKOwXBXjEsw3KY_rsvkCRv4GF5eG7gt38tzp_dAMq=w980-h735-no">
+            <a:extLst>
+              <a:ext uri="{FF2B5EF4-FFF2-40B4-BE49-F238E27FC236}">
+                <a16:creationId xmlns:a16="http://schemas.microsoft.com/office/drawing/2014/main" id="{3242B001-AAF1-41C4-B765-49D2255BC67F}"/>
+              </a:ext>
+            </a:extLst>
+          </p:cNvPr>
+          <p:cNvPicPr>
+            <a:picLocks noChangeAspect="1" noChangeArrowheads="1"/>
+          </p:cNvPicPr>
+          <p:nvPr/>
+        </p:nvPicPr>
+        <p:blipFill>
+          <a:blip r:embed="rId3">
+            <a:extLst>
+              <a:ext uri="{28A0092B-C50C-407E-A947-70E740481C1C}">
+                <a14:useLocalDpi xmlns:a14="http://schemas.microsoft.com/office/drawing/2010/main" val="0"/>
+              </a:ext>
+            </a:extLst>
+          </a:blip>
+          <a:srcRect/>
+          <a:stretch>
+            <a:fillRect/>
+          </a:stretch>
+        </p:blipFill>
+        <p:spPr bwMode="auto">
+          <a:xfrm>
+            <a:off x="746619" y="2147582"/>
+            <a:ext cx="5575881" cy="4181911"/>
+          </a:xfrm>
+          <a:prstGeom prst="rect">
+            <a:avLst/>
+          </a:prstGeom>
+          <a:noFill/>
+          <a:extLst>
+            <a:ext uri="{909E8E84-426E-40DD-AFC4-6F175D3DCCD1}">
+              <a14:hiddenFill xmlns:a14="http://schemas.microsoft.com/office/drawing/2010/main">
+                <a:solidFill>
+                  <a:srgbClr val="FFFFFF"/>
+                </a:solidFill>
+              </a14:hiddenFill>
+            </a:ext>
+          </a:extLst>
+        </p:spPr>
+      </p:pic>
+    </p:spTree>
+    <p:extLst>
+      <p:ext uri="{BB962C8B-B14F-4D97-AF65-F5344CB8AC3E}">
+        <p14:creationId xmlns:p14="http://schemas.microsoft.com/office/powerpoint/2010/main" val="3616890338"/>
+      </p:ext>
+    </p:extLst>
+  </p:cSld>
+  <p:clrMapOvr>
+    <a:masterClrMapping/>
+  </p:clrMapOvr>
+  <p:transition>
+    <p:fade/>
+  </p:transition>
+</p:sld>
+</file>
+
+<file path=ppt/slides/slide11.xml><?xml version="1.0" encoding="utf-8"?>
 <p:sld xmlns:a="http://schemas.openxmlformats.org/drawingml/2006/main" xmlns:r="http://schemas.openxmlformats.org/officeDocument/2006/relationships" xmlns:p="http://schemas.openxmlformats.org/presentationml/2006/main">
   <p:cSld>
     <p:spTree>
@@ -10312,104 +10441,496 @@
           <a:chExt cx="0" cy="0"/>
         </a:xfrm>
       </p:grpSpPr>
+      <p:sp>
+        <p:nvSpPr>
+          <p:cNvPr id="4" name="Title 4"/>
+          <p:cNvSpPr txBox="1">
+            <a:spLocks/>
+          </p:cNvSpPr>
+          <p:nvPr/>
+        </p:nvSpPr>
+        <p:spPr>
+          <a:xfrm>
+            <a:off x="344245" y="382364"/>
+            <a:ext cx="11034712" cy="1876425"/>
+          </a:xfrm>
+          <a:prstGeom prst="rect">
+            <a:avLst/>
+          </a:prstGeom>
+        </p:spPr>
+        <p:txBody>
+          <a:bodyPr>
+            <a:normAutofit/>
+          </a:bodyPr>
+          <a:lstStyle>
+            <a:lvl1pPr algn="l" defTabSz="914180" rtl="0" eaLnBrk="1" latinLnBrk="0" hangingPunct="1">
+              <a:lnSpc>
+                <a:spcPct val="90000"/>
+              </a:lnSpc>
+              <a:spcBef>
+                <a:spcPct val="0"/>
+              </a:spcBef>
+              <a:buNone/>
+              <a:defRPr lang="en-US" sz="5293" b="0" kern="1200" cap="none" spc="-100" baseline="0" dirty="0" smtClean="0">
+                <a:ln w="3175">
+                  <a:noFill/>
+                </a:ln>
+                <a:solidFill>
+                  <a:schemeClr val="bg1"/>
+                </a:solidFill>
+                <a:effectLst/>
+                <a:latin typeface="+mj-lt"/>
+                <a:ea typeface="+mn-ea"/>
+                <a:cs typeface="Segoe UI" pitchFamily="34" charset="0"/>
+              </a:defRPr>
+            </a:lvl1pPr>
+          </a:lstStyle>
+          <a:p>
+            <a:r>
+              <a:rPr lang="en-CA" sz="6600" dirty="0">
+                <a:solidFill>
+                  <a:schemeClr val="bg2"/>
+                </a:solidFill>
+              </a:rPr>
+              <a:t>Speakers</a:t>
+            </a:r>
+          </a:p>
+        </p:txBody>
+      </p:sp>
+      <p:sp>
+        <p:nvSpPr>
+          <p:cNvPr id="6" name="TextBox 5">
+            <a:extLst>
+              <a:ext uri="{FF2B5EF4-FFF2-40B4-BE49-F238E27FC236}">
+                <a16:creationId xmlns:a16="http://schemas.microsoft.com/office/drawing/2014/main" id="{5C2BCF1B-D436-4062-BDE8-8243B3F9F5BD}"/>
+              </a:ext>
+            </a:extLst>
+          </p:cNvPr>
+          <p:cNvSpPr txBox="1"/>
+          <p:nvPr/>
+        </p:nvSpPr>
+        <p:spPr>
+          <a:xfrm>
+            <a:off x="8681580" y="6475636"/>
+            <a:ext cx="5394754" cy="433965"/>
+          </a:xfrm>
+          <a:prstGeom prst="rect">
+            <a:avLst/>
+          </a:prstGeom>
+          <a:noFill/>
+        </p:spPr>
+        <p:txBody>
+          <a:bodyPr wrap="square" lIns="182880" tIns="146304" rIns="182880" bIns="146304" rtlCol="0">
+            <a:spAutoFit/>
+          </a:bodyPr>
+          <a:lstStyle/>
+          <a:p>
+            <a:r>
+              <a:rPr lang="en-US" sz="900" dirty="0">
+                <a:hlinkClick r:id="rId2" tooltip="http://www.slenquirer.com/2012/11/sle-promotes-healthy-eating-despite.html"/>
+              </a:rPr>
+              <a:t>This Photo</a:t>
+            </a:r>
+            <a:r>
+              <a:rPr lang="en-US" sz="900" dirty="0"/>
+              <a:t> by Unknown Author is licensed under </a:t>
+            </a:r>
+            <a:r>
+              <a:rPr lang="en-US" sz="900" dirty="0">
+                <a:hlinkClick r:id="rId3" tooltip="https://creativecommons.org/licenses/by-nc-sa/3.0/"/>
+              </a:rPr>
+              <a:t>CC BY-SA-NC</a:t>
+            </a:r>
+            <a:endParaRPr lang="en-US" sz="900" dirty="0"/>
+          </a:p>
+        </p:txBody>
+      </p:sp>
       <p:pic>
         <p:nvPicPr>
-          <p:cNvPr id="1026" name="Picture 2" descr="https://lh3.googleusercontent.com/jFbz8dCsUsy8hbvwNNkfDOrTH6FYWns5DzmTM1wHovBRvqRmS1owruXZ2jkahQbWexwZoyoqxi83pnwUkf4hORBAgn2FOMn4_xbD4NNinCJOiasYFGBZ3X8VTf3bQcllLNKRQjxgZ55zDABou-YyddJ0r0qJorLH-AEYcN8K1Lfzu2bnAWKwMe3klZnjez7OTSyn4Yn1CD0mcadMI_ToG18RaKIrODHceF48W1u1wWIwri4JYOicVNaCoYRohALgN6cGbrRao7BvSvvQJqQjELQ_4acNnzFoIe7DsEcK2JSW8UYVyfak4V6SH0GDZZOaXex4q-zsOdg0V18oRsHZ5yZg6J1QfZOtMOxvBqw1a-6yG7U3SwUXYnnYUtludbwQWXw1JeQRg0eVgGtU4uKKP_8lUKahw2fZVQe-s3fELqgAY4QSuAGAJEsYpYsqSBjkq8BESrlLUd_kOZ26_inA_mZoFOmDQixQ1AMjlIYXsCoA0N3MPnwaB8pQzNqcUyQhkwgYytfoE4bKBhtzg3-gdHd6-YMpr_CqfDJO2IYZ0fRdwkCxNs4u0YpxpjcPRjeNEpn0_schcxvahNyGQP42_pTprKmCHE_eHcsxW8-Ikf9mQYsuLnykC3rC5fVjjv_VK-fLqM2IJtAOakNJ3pr89RDZlOe9k8Z2=w980-h735-no">
+          <p:cNvPr id="11" name="Picture 10">
             <a:extLst>
               <a:ext uri="{FF2B5EF4-FFF2-40B4-BE49-F238E27FC236}">
-                <a16:creationId xmlns:a16="http://schemas.microsoft.com/office/drawing/2014/main" id="{48638A12-BB87-4EBC-AA83-483B1AA6E1C9}"/>
+                <a16:creationId xmlns:a16="http://schemas.microsoft.com/office/drawing/2014/main" id="{1961063A-2840-49EA-90C3-C5B9428C2DD7}"/>
               </a:ext>
             </a:extLst>
           </p:cNvPr>
           <p:cNvPicPr>
-            <a:picLocks noChangeAspect="1" noChangeArrowheads="1"/>
+            <a:picLocks noChangeAspect="1"/>
           </p:cNvPicPr>
           <p:nvPr/>
         </p:nvPicPr>
         <p:blipFill>
-          <a:blip r:embed="rId2">
+          <a:blip r:embed="rId4">
             <a:extLst>
               <a:ext uri="{28A0092B-C50C-407E-A947-70E740481C1C}">
                 <a14:useLocalDpi xmlns:a14="http://schemas.microsoft.com/office/drawing/2010/main" val="0"/>
               </a:ext>
             </a:extLst>
           </a:blip>
-          <a:srcRect/>
           <a:stretch>
             <a:fillRect/>
           </a:stretch>
         </p:blipFill>
-        <p:spPr bwMode="auto">
+        <p:spPr>
           <a:xfrm>
-            <a:off x="6529097" y="293365"/>
-            <a:ext cx="5330139" cy="3997604"/>
+            <a:off x="1137601" y="1517232"/>
+            <a:ext cx="2462976" cy="2462976"/>
+          </a:xfrm>
+          <a:prstGeom prst="rect">
+            <a:avLst/>
+          </a:prstGeom>
+        </p:spPr>
+      </p:pic>
+      <p:sp>
+        <p:nvSpPr>
+          <p:cNvPr id="12" name="TextBox 11">
+            <a:extLst>
+              <a:ext uri="{FF2B5EF4-FFF2-40B4-BE49-F238E27FC236}">
+                <a16:creationId xmlns:a16="http://schemas.microsoft.com/office/drawing/2014/main" id="{85971E54-AD77-44C6-B148-6B5A1E057996}"/>
+              </a:ext>
+            </a:extLst>
+          </p:cNvPr>
+          <p:cNvSpPr txBox="1"/>
+          <p:nvPr/>
+        </p:nvSpPr>
+        <p:spPr>
+          <a:xfrm>
+            <a:off x="864973" y="3980208"/>
+            <a:ext cx="3546389" cy="627864"/>
           </a:xfrm>
           <a:prstGeom prst="rect">
             <a:avLst/>
           </a:prstGeom>
           <a:noFill/>
-          <a:extLst>
-            <a:ext uri="{909E8E84-426E-40DD-AFC4-6F175D3DCCD1}">
-              <a14:hiddenFill xmlns:a14="http://schemas.microsoft.com/office/drawing/2010/main">
+        </p:spPr>
+        <p:txBody>
+          <a:bodyPr wrap="square" lIns="182880" tIns="146304" rIns="182880" bIns="146304" rtlCol="0">
+            <a:spAutoFit/>
+          </a:bodyPr>
+          <a:lstStyle/>
+          <a:p>
+            <a:pPr>
+              <a:lnSpc>
+                <a:spcPct val="90000"/>
+              </a:lnSpc>
+              <a:spcAft>
+                <a:spcPts val="600"/>
+              </a:spcAft>
+            </a:pPr>
+            <a:r>
+              <a:rPr lang="en-CA" sz="2400" b="1" dirty="0">
                 <a:solidFill>
-                  <a:srgbClr val="FFFFFF"/>
+                  <a:schemeClr val="bg1"/>
                 </a:solidFill>
-              </a14:hiddenFill>
-            </a:ext>
-          </a:extLst>
-        </p:spPr>
-      </p:pic>
-      <p:pic>
-        <p:nvPicPr>
-          <p:cNvPr id="1028" name="Picture 4" descr="https://lh3.googleusercontent.com/ysql-HDtaZYsXX48TXavonK4X01hwPXLbkSlSQZ4LdgN6o1sTHbl6NW0A9hKPN_bHV9NnKAcGnFTLBmCiiNv0NanEXNVhruCBVe-84519ZRhBL9BpfVVZBnoHzpCdr6wRXWWvthJfRDomELs_2bkPv3FhRpx8H4y7VPckTPtcli-sin2LuXcj2xNH5F--bJKgnEXOMdejLzEwoPR0hfU4Y5QD82mh3i8aXjsI0K4Nd1LXxIScgI5C3ADM15ctBxX13kvOJVS2yuchs3ynta61UKU4XomK6-Omw94QVKNHI_7gKMu3EH0ndTIo9uVycERPUofp-L46qGTOZHLAmDWg4Tune_-2iPUi9Yo1gxmcX5u4Ql97GhfuZfaA0-Yd84v1HvQ7BarukAznxG9ecTwxBlHar0OKQ4fc4nnNU0dpz97HZMtOob4xrQ3jiykb55j5gxE7IC-XuGXgBIXuhLgRJ8oNbNUpN-9ZWTP40NdCzhaLJzoTRcwxZN2Jhw0x7Fof34TwpEMMEn071AjleByCOiJlHxL1mCLtTgxj2qj-rXV6uZye0GwNQMqGjBCAdUe7VYafc-pM07DxLHTxtHCXrKhVg43G_mrrdNe2jclthbCve2lQjPfu2SUKOwXBXjEsw3KY_rsvkCRv4GF5eG7gt38tzp_dAMq=w980-h735-no">
+              </a:rPr>
+              <a:t>Carl-Hugo Marcotte</a:t>
+            </a:r>
+            <a:endParaRPr lang="en-US" sz="2400" b="1" dirty="0" err="1">
+              <a:solidFill>
+                <a:schemeClr val="bg1"/>
+              </a:solidFill>
+            </a:endParaRPr>
+          </a:p>
+        </p:txBody>
+      </p:sp>
+      <p:sp>
+        <p:nvSpPr>
+          <p:cNvPr id="13" name="TextBox 12">
             <a:extLst>
               <a:ext uri="{FF2B5EF4-FFF2-40B4-BE49-F238E27FC236}">
-                <a16:creationId xmlns:a16="http://schemas.microsoft.com/office/drawing/2014/main" id="{3242B001-AAF1-41C4-B765-49D2255BC67F}"/>
+                <a16:creationId xmlns:a16="http://schemas.microsoft.com/office/drawing/2014/main" id="{89F31CCD-2949-408C-B72D-47E1F1F8FA71}"/>
               </a:ext>
             </a:extLst>
           </p:cNvPr>
-          <p:cNvPicPr>
-            <a:picLocks noChangeAspect="1" noChangeArrowheads="1"/>
-          </p:cNvPicPr>
+          <p:cNvSpPr txBox="1"/>
           <p:nvPr/>
-        </p:nvPicPr>
-        <p:blipFill>
-          <a:blip r:embed="rId3">
-            <a:extLst>
-              <a:ext uri="{28A0092B-C50C-407E-A947-70E740481C1C}">
-                <a14:useLocalDpi xmlns:a14="http://schemas.microsoft.com/office/drawing/2010/main" val="0"/>
-              </a:ext>
-            </a:extLst>
-          </a:blip>
-          <a:srcRect/>
-          <a:stretch>
-            <a:fillRect/>
-          </a:stretch>
-        </p:blipFill>
-        <p:spPr bwMode="auto">
+        </p:nvSpPr>
+        <p:spPr>
           <a:xfrm>
-            <a:off x="746619" y="2147582"/>
-            <a:ext cx="5575881" cy="4181911"/>
+            <a:off x="864972" y="4617493"/>
+            <a:ext cx="5762368" cy="1446550"/>
           </a:xfrm>
           <a:prstGeom prst="rect">
             <a:avLst/>
           </a:prstGeom>
           <a:noFill/>
-          <a:extLst>
-            <a:ext uri="{909E8E84-426E-40DD-AFC4-6F175D3DCCD1}">
-              <a14:hiddenFill xmlns:a14="http://schemas.microsoft.com/office/drawing/2010/main">
+        </p:spPr>
+        <p:txBody>
+          <a:bodyPr wrap="square" lIns="182880" tIns="146304" rIns="182880" bIns="146304" rtlCol="0">
+            <a:spAutoFit/>
+          </a:bodyPr>
+          <a:lstStyle/>
+          <a:p>
+            <a:pPr>
+              <a:lnSpc>
+                <a:spcPct val="90000"/>
+              </a:lnSpc>
+              <a:spcAft>
+                <a:spcPts val="600"/>
+              </a:spcAft>
+            </a:pPr>
+            <a:r>
+              <a:rPr lang="en-CA" sz="2400" dirty="0">
                 <a:solidFill>
-                  <a:srgbClr val="FFFFFF"/>
+                  <a:schemeClr val="bg1"/>
                 </a:solidFill>
-              </a14:hiddenFill>
-            </a:ext>
-          </a:extLst>
+              </a:rPr>
+              <a:t>Twitter: </a:t>
+            </a:r>
+            <a:r>
+              <a:rPr lang="en-CA" sz="2400" dirty="0" err="1">
+                <a:solidFill>
+                  <a:schemeClr val="bg1"/>
+                </a:solidFill>
+                <a:hlinkClick r:id="rId5"/>
+              </a:rPr>
+              <a:t>CarlHugoM</a:t>
+            </a:r>
+            <a:endParaRPr lang="en-CA" sz="2400" dirty="0">
+              <a:solidFill>
+                <a:schemeClr val="bg1"/>
+              </a:solidFill>
+            </a:endParaRPr>
+          </a:p>
+          <a:p>
+            <a:pPr>
+              <a:lnSpc>
+                <a:spcPct val="90000"/>
+              </a:lnSpc>
+              <a:spcAft>
+                <a:spcPts val="600"/>
+              </a:spcAft>
+            </a:pPr>
+            <a:r>
+              <a:rPr lang="en-CA" sz="2400" dirty="0">
+                <a:solidFill>
+                  <a:schemeClr val="bg1"/>
+                </a:solidFill>
+              </a:rPr>
+              <a:t>Blog: </a:t>
+            </a:r>
+            <a:r>
+              <a:rPr lang="en-US" sz="2400" dirty="0">
+                <a:hlinkClick r:id="rId6"/>
+              </a:rPr>
+              <a:t>https://www.forevolve.com/</a:t>
+            </a:r>
+            <a:endParaRPr lang="en-US" sz="2400" dirty="0"/>
+          </a:p>
+          <a:p>
+            <a:pPr>
+              <a:lnSpc>
+                <a:spcPct val="90000"/>
+              </a:lnSpc>
+              <a:spcAft>
+                <a:spcPts val="600"/>
+              </a:spcAft>
+            </a:pPr>
+            <a:r>
+              <a:rPr lang="en-US" sz="2400" dirty="0">
+                <a:solidFill>
+                  <a:schemeClr val="bg1"/>
+                </a:solidFill>
+              </a:rPr>
+              <a:t>Other: </a:t>
+            </a:r>
+            <a:r>
+              <a:rPr lang="en-US" sz="2400" dirty="0">
+                <a:hlinkClick r:id="rId7"/>
+              </a:rPr>
+              <a:t>https://github.com/Carl-Hugo</a:t>
+            </a:r>
+            <a:endParaRPr lang="en-CA" sz="2400" dirty="0">
+              <a:solidFill>
+                <a:schemeClr val="bg1"/>
+              </a:solidFill>
+            </a:endParaRPr>
+          </a:p>
+        </p:txBody>
+      </p:sp>
+      <p:pic>
+        <p:nvPicPr>
+          <p:cNvPr id="14" name="Picture 13">
+            <a:extLst>
+              <a:ext uri="{FF2B5EF4-FFF2-40B4-BE49-F238E27FC236}">
+                <a16:creationId xmlns:a16="http://schemas.microsoft.com/office/drawing/2014/main" id="{BBDA2106-596F-47CD-A5B0-7B7626A220FC}"/>
+              </a:ext>
+            </a:extLst>
+          </p:cNvPr>
+          <p:cNvPicPr>
+            <a:picLocks noChangeAspect="1"/>
+          </p:cNvPicPr>
+          <p:nvPr/>
+        </p:nvPicPr>
+        <p:blipFill>
+          <a:blip r:embed="rId8">
+            <a:extLst>
+              <a:ext uri="{28A0092B-C50C-407E-A947-70E740481C1C}">
+                <a14:useLocalDpi xmlns:a14="http://schemas.microsoft.com/office/drawing/2010/main" val="0"/>
+              </a:ext>
+              <a:ext uri="{837473B0-CC2E-450A-ABE3-18F120FF3D39}">
+                <a1611:picAttrSrcUrl xmlns:a1611="http://schemas.microsoft.com/office/drawing/2016/11/main" r:id="rId2"/>
+              </a:ext>
+            </a:extLst>
+          </a:blip>
+          <a:stretch>
+            <a:fillRect/>
+          </a:stretch>
+        </p:blipFill>
+        <p:spPr>
+          <a:xfrm>
+            <a:off x="6830589" y="1517232"/>
+            <a:ext cx="2601735" cy="2462976"/>
+          </a:xfrm>
+          <a:prstGeom prst="rect">
+            <a:avLst/>
+          </a:prstGeom>
         </p:spPr>
       </p:pic>
+      <p:sp>
+        <p:nvSpPr>
+          <p:cNvPr id="15" name="TextBox 14">
+            <a:extLst>
+              <a:ext uri="{FF2B5EF4-FFF2-40B4-BE49-F238E27FC236}">
+                <a16:creationId xmlns:a16="http://schemas.microsoft.com/office/drawing/2014/main" id="{85D7B070-0B80-4B92-81B9-E115FB94A0F2}"/>
+              </a:ext>
+            </a:extLst>
+          </p:cNvPr>
+          <p:cNvSpPr txBox="1"/>
+          <p:nvPr/>
+        </p:nvSpPr>
+        <p:spPr>
+          <a:xfrm>
+            <a:off x="6627340" y="3980208"/>
+            <a:ext cx="3546389" cy="627864"/>
+          </a:xfrm>
+          <a:prstGeom prst="rect">
+            <a:avLst/>
+          </a:prstGeom>
+          <a:noFill/>
+        </p:spPr>
+        <p:txBody>
+          <a:bodyPr wrap="square" lIns="182880" tIns="146304" rIns="182880" bIns="146304" rtlCol="0">
+            <a:spAutoFit/>
+          </a:bodyPr>
+          <a:lstStyle/>
+          <a:p>
+            <a:pPr>
+              <a:lnSpc>
+                <a:spcPct val="90000"/>
+              </a:lnSpc>
+              <a:spcAft>
+                <a:spcPts val="600"/>
+              </a:spcAft>
+            </a:pPr>
+            <a:r>
+              <a:rPr lang="en-CA" sz="2400" b="1" dirty="0">
+                <a:solidFill>
+                  <a:schemeClr val="bg1"/>
+                </a:solidFill>
+              </a:rPr>
+              <a:t>John Doe</a:t>
+            </a:r>
+            <a:endParaRPr lang="en-US" sz="2400" b="1" dirty="0" err="1">
+              <a:solidFill>
+                <a:schemeClr val="bg1"/>
+              </a:solidFill>
+            </a:endParaRPr>
+          </a:p>
+        </p:txBody>
+      </p:sp>
+      <p:sp>
+        <p:nvSpPr>
+          <p:cNvPr id="16" name="TextBox 15">
+            <a:extLst>
+              <a:ext uri="{FF2B5EF4-FFF2-40B4-BE49-F238E27FC236}">
+                <a16:creationId xmlns:a16="http://schemas.microsoft.com/office/drawing/2014/main" id="{ED9169BA-311E-4F62-B0D5-3CA1ABA7C549}"/>
+              </a:ext>
+            </a:extLst>
+          </p:cNvPr>
+          <p:cNvSpPr txBox="1"/>
+          <p:nvPr/>
+        </p:nvSpPr>
+        <p:spPr>
+          <a:xfrm>
+            <a:off x="6627340" y="4617493"/>
+            <a:ext cx="3343140" cy="1446550"/>
+          </a:xfrm>
+          <a:prstGeom prst="rect">
+            <a:avLst/>
+          </a:prstGeom>
+          <a:noFill/>
+        </p:spPr>
+        <p:txBody>
+          <a:bodyPr wrap="square" lIns="182880" tIns="146304" rIns="182880" bIns="146304" rtlCol="0">
+            <a:spAutoFit/>
+          </a:bodyPr>
+          <a:lstStyle/>
+          <a:p>
+            <a:pPr>
+              <a:lnSpc>
+                <a:spcPct val="90000"/>
+              </a:lnSpc>
+              <a:spcAft>
+                <a:spcPts val="600"/>
+              </a:spcAft>
+            </a:pPr>
+            <a:r>
+              <a:rPr lang="en-CA" sz="2400" dirty="0">
+                <a:solidFill>
+                  <a:schemeClr val="bg1"/>
+                </a:solidFill>
+              </a:rPr>
+              <a:t>Twitter:</a:t>
+            </a:r>
+          </a:p>
+          <a:p>
+            <a:pPr>
+              <a:lnSpc>
+                <a:spcPct val="90000"/>
+              </a:lnSpc>
+              <a:spcAft>
+                <a:spcPts val="600"/>
+              </a:spcAft>
+            </a:pPr>
+            <a:r>
+              <a:rPr lang="en-CA" sz="2400" dirty="0">
+                <a:solidFill>
+                  <a:schemeClr val="bg1"/>
+                </a:solidFill>
+              </a:rPr>
+              <a:t>Blog: </a:t>
+            </a:r>
+          </a:p>
+          <a:p>
+            <a:pPr>
+              <a:lnSpc>
+                <a:spcPct val="90000"/>
+              </a:lnSpc>
+              <a:spcAft>
+                <a:spcPts val="600"/>
+              </a:spcAft>
+            </a:pPr>
+            <a:r>
+              <a:rPr lang="en-CA" sz="2400" dirty="0">
+                <a:solidFill>
+                  <a:schemeClr val="bg1"/>
+                </a:solidFill>
+              </a:rPr>
+              <a:t>Other:</a:t>
+            </a:r>
+            <a:endParaRPr lang="en-US" sz="2400" dirty="0" err="1">
+              <a:solidFill>
+                <a:schemeClr val="bg1"/>
+              </a:solidFill>
+            </a:endParaRPr>
+          </a:p>
+        </p:txBody>
+      </p:sp>
     </p:spTree>
     <p:extLst>
       <p:ext uri="{BB962C8B-B14F-4D97-AF65-F5344CB8AC3E}">
-        <p14:creationId xmlns:p14="http://schemas.microsoft.com/office/powerpoint/2010/main" val="3616890338"/>
+        <p14:creationId xmlns:p14="http://schemas.microsoft.com/office/powerpoint/2010/main" val="1264934386"/>
       </p:ext>
     </p:extLst>
   </p:cSld>

</xml_diff>

<commit_message>
Quickfix in the slides
</commit_message>
<xml_diff>
--- a/Locations/Ottawa/Welcome.pptx
+++ b/Locations/Ottawa/Welcome.pptx
@@ -5,7 +5,7 @@
     <p:sldMasterId id="2147483732" r:id="rId1"/>
   </p:sldMasterIdLst>
   <p:notesMasterIdLst>
-    <p:notesMasterId r:id="rId13"/>
+    <p:notesMasterId r:id="rId12"/>
   </p:notesMasterIdLst>
   <p:sldIdLst>
     <p:sldId id="642" r:id="rId2"/>
@@ -16,9 +16,8 @@
     <p:sldId id="651" r:id="rId7"/>
     <p:sldId id="649" r:id="rId8"/>
     <p:sldId id="653" r:id="rId9"/>
-    <p:sldId id="654" r:id="rId10"/>
-    <p:sldId id="650" r:id="rId11"/>
-    <p:sldId id="648" r:id="rId12"/>
+    <p:sldId id="650" r:id="rId10"/>
+    <p:sldId id="648" r:id="rId11"/>
   </p:sldIdLst>
   <p:sldSz cx="12192000" cy="6858000"/>
   <p:notesSz cx="7010400" cy="9296400"/>
@@ -130,7 +129,6 @@
             <p14:sldId id="651"/>
             <p14:sldId id="649"/>
             <p14:sldId id="653"/>
-            <p14:sldId id="654"/>
             <p14:sldId id="650"/>
             <p14:sldId id="648"/>
           </p14:sldIdLst>
@@ -238,7 +236,7 @@
           <a:p>
             <a:fld id="{9EB326D8-4C38-4835-91AB-B79CDC0B07B3}" type="datetimeFigureOut">
               <a:rPr lang="en-US" smtClean="0"/>
-              <a:t>4/26/2019</a:t>
+              <a:t>2019-04-27</a:t>
             </a:fld>
             <a:endParaRPr lang="en-US"/>
           </a:p>
@@ -738,7 +736,7 @@
           <a:p>
             <a:fld id="{2C52CFDC-D2D5-4B9F-BA75-89F771E01AEB}" type="slidenum">
               <a:rPr lang="en-US" smtClean="0"/>
-              <a:t>11</a:t>
+              <a:t>10</a:t>
             </a:fld>
             <a:endParaRPr lang="en-US"/>
           </a:p>
@@ -5636,7 +5634,7 @@
           <a:p>
             <a:fld id="{021C408F-DF0D-4580-9F48-C473147CA8AF}" type="datetimeFigureOut">
               <a:rPr lang="en-US" smtClean="0"/>
-              <a:t>4/26/2019</a:t>
+              <a:t>2019-04-27</a:t>
             </a:fld>
             <a:endParaRPr lang="en-US"/>
           </a:p>
@@ -7023,133 +7021,6 @@
           <a:chExt cx="0" cy="0"/>
         </a:xfrm>
       </p:grpSpPr>
-      <p:pic>
-        <p:nvPicPr>
-          <p:cNvPr id="1026" name="Picture 2" descr="https://lh3.googleusercontent.com/jFbz8dCsUsy8hbvwNNkfDOrTH6FYWns5DzmTM1wHovBRvqRmS1owruXZ2jkahQbWexwZoyoqxi83pnwUkf4hORBAgn2FOMn4_xbD4NNinCJOiasYFGBZ3X8VTf3bQcllLNKRQjxgZ55zDABou-YyddJ0r0qJorLH-AEYcN8K1Lfzu2bnAWKwMe3klZnjez7OTSyn4Yn1CD0mcadMI_ToG18RaKIrODHceF48W1u1wWIwri4JYOicVNaCoYRohALgN6cGbrRao7BvSvvQJqQjELQ_4acNnzFoIe7DsEcK2JSW8UYVyfak4V6SH0GDZZOaXex4q-zsOdg0V18oRsHZ5yZg6J1QfZOtMOxvBqw1a-6yG7U3SwUXYnnYUtludbwQWXw1JeQRg0eVgGtU4uKKP_8lUKahw2fZVQe-s3fELqgAY4QSuAGAJEsYpYsqSBjkq8BESrlLUd_kOZ26_inA_mZoFOmDQixQ1AMjlIYXsCoA0N3MPnwaB8pQzNqcUyQhkwgYytfoE4bKBhtzg3-gdHd6-YMpr_CqfDJO2IYZ0fRdwkCxNs4u0YpxpjcPRjeNEpn0_schcxvahNyGQP42_pTprKmCHE_eHcsxW8-Ikf9mQYsuLnykC3rC5fVjjv_VK-fLqM2IJtAOakNJ3pr89RDZlOe9k8Z2=w980-h735-no">
-            <a:extLst>
-              <a:ext uri="{FF2B5EF4-FFF2-40B4-BE49-F238E27FC236}">
-                <a16:creationId xmlns:a16="http://schemas.microsoft.com/office/drawing/2014/main" id="{48638A12-BB87-4EBC-AA83-483B1AA6E1C9}"/>
-              </a:ext>
-            </a:extLst>
-          </p:cNvPr>
-          <p:cNvPicPr>
-            <a:picLocks noChangeAspect="1" noChangeArrowheads="1"/>
-          </p:cNvPicPr>
-          <p:nvPr/>
-        </p:nvPicPr>
-        <p:blipFill>
-          <a:blip r:embed="rId2">
-            <a:extLst>
-              <a:ext uri="{28A0092B-C50C-407E-A947-70E740481C1C}">
-                <a14:useLocalDpi xmlns:a14="http://schemas.microsoft.com/office/drawing/2010/main" val="0"/>
-              </a:ext>
-            </a:extLst>
-          </a:blip>
-          <a:srcRect/>
-          <a:stretch>
-            <a:fillRect/>
-          </a:stretch>
-        </p:blipFill>
-        <p:spPr bwMode="auto">
-          <a:xfrm>
-            <a:off x="6529097" y="293365"/>
-            <a:ext cx="5330139" cy="3997604"/>
-          </a:xfrm>
-          <a:prstGeom prst="rect">
-            <a:avLst/>
-          </a:prstGeom>
-          <a:noFill/>
-          <a:extLst>
-            <a:ext uri="{909E8E84-426E-40DD-AFC4-6F175D3DCCD1}">
-              <a14:hiddenFill xmlns:a14="http://schemas.microsoft.com/office/drawing/2010/main">
-                <a:solidFill>
-                  <a:srgbClr val="FFFFFF"/>
-                </a:solidFill>
-              </a14:hiddenFill>
-            </a:ext>
-          </a:extLst>
-        </p:spPr>
-      </p:pic>
-      <p:pic>
-        <p:nvPicPr>
-          <p:cNvPr id="1028" name="Picture 4" descr="https://lh3.googleusercontent.com/ysql-HDtaZYsXX48TXavonK4X01hwPXLbkSlSQZ4LdgN6o1sTHbl6NW0A9hKPN_bHV9NnKAcGnFTLBmCiiNv0NanEXNVhruCBVe-84519ZRhBL9BpfVVZBnoHzpCdr6wRXWWvthJfRDomELs_2bkPv3FhRpx8H4y7VPckTPtcli-sin2LuXcj2xNH5F--bJKgnEXOMdejLzEwoPR0hfU4Y5QD82mh3i8aXjsI0K4Nd1LXxIScgI5C3ADM15ctBxX13kvOJVS2yuchs3ynta61UKU4XomK6-Omw94QVKNHI_7gKMu3EH0ndTIo9uVycERPUofp-L46qGTOZHLAmDWg4Tune_-2iPUi9Yo1gxmcX5u4Ql97GhfuZfaA0-Yd84v1HvQ7BarukAznxG9ecTwxBlHar0OKQ4fc4nnNU0dpz97HZMtOob4xrQ3jiykb55j5gxE7IC-XuGXgBIXuhLgRJ8oNbNUpN-9ZWTP40NdCzhaLJzoTRcwxZN2Jhw0x7Fof34TwpEMMEn071AjleByCOiJlHxL1mCLtTgxj2qj-rXV6uZye0GwNQMqGjBCAdUe7VYafc-pM07DxLHTxtHCXrKhVg43G_mrrdNe2jclthbCve2lQjPfu2SUKOwXBXjEsw3KY_rsvkCRv4GF5eG7gt38tzp_dAMq=w980-h735-no">
-            <a:extLst>
-              <a:ext uri="{FF2B5EF4-FFF2-40B4-BE49-F238E27FC236}">
-                <a16:creationId xmlns:a16="http://schemas.microsoft.com/office/drawing/2014/main" id="{3242B001-AAF1-41C4-B765-49D2255BC67F}"/>
-              </a:ext>
-            </a:extLst>
-          </p:cNvPr>
-          <p:cNvPicPr>
-            <a:picLocks noChangeAspect="1" noChangeArrowheads="1"/>
-          </p:cNvPicPr>
-          <p:nvPr/>
-        </p:nvPicPr>
-        <p:blipFill>
-          <a:blip r:embed="rId3">
-            <a:extLst>
-              <a:ext uri="{28A0092B-C50C-407E-A947-70E740481C1C}">
-                <a14:useLocalDpi xmlns:a14="http://schemas.microsoft.com/office/drawing/2010/main" val="0"/>
-              </a:ext>
-            </a:extLst>
-          </a:blip>
-          <a:srcRect/>
-          <a:stretch>
-            <a:fillRect/>
-          </a:stretch>
-        </p:blipFill>
-        <p:spPr bwMode="auto">
-          <a:xfrm>
-            <a:off x="746619" y="2147582"/>
-            <a:ext cx="5575881" cy="4181911"/>
-          </a:xfrm>
-          <a:prstGeom prst="rect">
-            <a:avLst/>
-          </a:prstGeom>
-          <a:noFill/>
-          <a:extLst>
-            <a:ext uri="{909E8E84-426E-40DD-AFC4-6F175D3DCCD1}">
-              <a14:hiddenFill xmlns:a14="http://schemas.microsoft.com/office/drawing/2010/main">
-                <a:solidFill>
-                  <a:srgbClr val="FFFFFF"/>
-                </a:solidFill>
-              </a14:hiddenFill>
-            </a:ext>
-          </a:extLst>
-        </p:spPr>
-      </p:pic>
-    </p:spTree>
-    <p:extLst>
-      <p:ext uri="{BB962C8B-B14F-4D97-AF65-F5344CB8AC3E}">
-        <p14:creationId xmlns:p14="http://schemas.microsoft.com/office/powerpoint/2010/main" val="3616890338"/>
-      </p:ext>
-    </p:extLst>
-  </p:cSld>
-  <p:clrMapOvr>
-    <a:masterClrMapping/>
-  </p:clrMapOvr>
-  <p:transition>
-    <p:fade/>
-  </p:transition>
-</p:sld>
-</file>
-
-<file path=ppt/slides/slide11.xml><?xml version="1.0" encoding="utf-8"?>
-<p:sld xmlns:a="http://schemas.openxmlformats.org/drawingml/2006/main" xmlns:r="http://schemas.openxmlformats.org/officeDocument/2006/relationships" xmlns:p="http://schemas.openxmlformats.org/presentationml/2006/main">
-  <p:cSld>
-    <p:spTree>
-      <p:nvGrpSpPr>
-        <p:cNvPr id="1" name=""/>
-        <p:cNvGrpSpPr/>
-        <p:nvPr/>
-      </p:nvGrpSpPr>
-      <p:grpSpPr>
-        <a:xfrm>
-          <a:off x="0" y="0"/>
-          <a:ext cx="0" cy="0"/>
-          <a:chOff x="0" y="0"/>
-          <a:chExt cx="0" cy="0"/>
-        </a:xfrm>
-      </p:grpSpPr>
       <p:sp>
         <p:nvSpPr>
           <p:cNvPr id="5" name="Text Placeholder 4"/>
@@ -7220,7 +7091,7 @@
             </a:r>
             <a:r>
               <a:rPr lang="en-US" dirty="0"/>
-              <a:t>: https://github.com/FBoucher/GlobalAzureBootcamp-2019</a:t>
+              <a:t>: https://github.com/MsDevMtl/GlobalAzureBootcamp-2019</a:t>
             </a:r>
           </a:p>
           <a:p>
@@ -8913,45 +8784,6 @@
           </a:p>
         </p:txBody>
       </p:sp>
-      <p:pic>
-        <p:nvPicPr>
-          <p:cNvPr id="11" name="Picture 10">
-            <a:extLst>
-              <a:ext uri="{FF2B5EF4-FFF2-40B4-BE49-F238E27FC236}">
-                <a16:creationId xmlns:a16="http://schemas.microsoft.com/office/drawing/2014/main" id="{1961063A-2840-49EA-90C3-C5B9428C2DD7}"/>
-              </a:ext>
-            </a:extLst>
-          </p:cNvPr>
-          <p:cNvPicPr>
-            <a:picLocks noChangeAspect="1"/>
-          </p:cNvPicPr>
-          <p:nvPr/>
-        </p:nvPicPr>
-        <p:blipFill>
-          <a:blip r:embed="rId4">
-            <a:extLst>
-              <a:ext uri="{28A0092B-C50C-407E-A947-70E740481C1C}">
-                <a14:useLocalDpi xmlns:a14="http://schemas.microsoft.com/office/drawing/2010/main" val="0"/>
-              </a:ext>
-              <a:ext uri="{837473B0-CC2E-450A-ABE3-18F120FF3D39}">
-                <a1611:picAttrSrcUrl xmlns:a1611="http://schemas.microsoft.com/office/drawing/2016/11/main" r:id="rId2"/>
-              </a:ext>
-            </a:extLst>
-          </a:blip>
-          <a:stretch>
-            <a:fillRect/>
-          </a:stretch>
-        </p:blipFill>
-        <p:spPr>
-          <a:xfrm>
-            <a:off x="1068222" y="1517232"/>
-            <a:ext cx="2601735" cy="2462976"/>
-          </a:xfrm>
-          <a:prstGeom prst="rect">
-            <a:avLst/>
-          </a:prstGeom>
-        </p:spPr>
-      </p:pic>
       <p:sp>
         <p:nvSpPr>
           <p:cNvPr id="12" name="TextBox 11">
@@ -8989,18 +8821,13 @@
               </a:spcAft>
             </a:pPr>
             <a:r>
-              <a:rPr lang="en-CA" sz="2400" b="1" dirty="0">
+              <a:rPr lang="en-US" sz="2400" b="1" dirty="0">
                 <a:solidFill>
                   <a:schemeClr val="bg1"/>
                 </a:solidFill>
               </a:rPr>
-              <a:t>Jane Doe</a:t>
-            </a:r>
-            <a:endParaRPr lang="en-US" sz="2400" b="1" dirty="0" err="1">
-              <a:solidFill>
-                <a:schemeClr val="bg1"/>
-              </a:solidFill>
-            </a:endParaRPr>
+              <a:t>Eric Leonard</a:t>
+            </a:r>
           </a:p>
         </p:txBody>
       </p:sp>
@@ -9046,8 +8873,21 @@
                   <a:schemeClr val="bg1"/>
                 </a:solidFill>
               </a:rPr>
-              <a:t>Twitter:</a:t>
-            </a:r>
+              <a:t>Twitter: @</a:t>
+            </a:r>
+            <a:r>
+              <a:rPr lang="en-CA" sz="2400" dirty="0" err="1">
+                <a:solidFill>
+                  <a:schemeClr val="bg1"/>
+                </a:solidFill>
+              </a:rPr>
+              <a:t>erleonard</a:t>
+            </a:r>
+            <a:endParaRPr lang="en-CA" sz="2400" dirty="0">
+              <a:solidFill>
+                <a:schemeClr val="bg1"/>
+              </a:solidFill>
+            </a:endParaRPr>
           </a:p>
           <a:p>
             <a:pPr>
@@ -9064,7 +8904,7 @@
                   <a:schemeClr val="bg1"/>
                 </a:solidFill>
               </a:rPr>
-              <a:t>Blog: </a:t>
+              <a:t>Blog: erleonard.me</a:t>
             </a:r>
           </a:p>
           <a:p>
@@ -9076,14 +8916,6 @@
                 <a:spcPts val="600"/>
               </a:spcAft>
             </a:pPr>
-            <a:r>
-              <a:rPr lang="en-CA" sz="2400" dirty="0">
-                <a:solidFill>
-                  <a:schemeClr val="bg1"/>
-                </a:solidFill>
-              </a:rPr>
-              <a:t>Other:</a:t>
-            </a:r>
             <a:endParaRPr lang="en-US" sz="2400" dirty="0" err="1">
               <a:solidFill>
                 <a:schemeClr val="bg1"/>
@@ -9092,45 +8924,6 @@
           </a:p>
         </p:txBody>
       </p:sp>
-      <p:pic>
-        <p:nvPicPr>
-          <p:cNvPr id="14" name="Picture 13">
-            <a:extLst>
-              <a:ext uri="{FF2B5EF4-FFF2-40B4-BE49-F238E27FC236}">
-                <a16:creationId xmlns:a16="http://schemas.microsoft.com/office/drawing/2014/main" id="{BBDA2106-596F-47CD-A5B0-7B7626A220FC}"/>
-              </a:ext>
-            </a:extLst>
-          </p:cNvPr>
-          <p:cNvPicPr>
-            <a:picLocks noChangeAspect="1"/>
-          </p:cNvPicPr>
-          <p:nvPr/>
-        </p:nvPicPr>
-        <p:blipFill>
-          <a:blip r:embed="rId4">
-            <a:extLst>
-              <a:ext uri="{28A0092B-C50C-407E-A947-70E740481C1C}">
-                <a14:useLocalDpi xmlns:a14="http://schemas.microsoft.com/office/drawing/2010/main" val="0"/>
-              </a:ext>
-              <a:ext uri="{837473B0-CC2E-450A-ABE3-18F120FF3D39}">
-                <a1611:picAttrSrcUrl xmlns:a1611="http://schemas.microsoft.com/office/drawing/2016/11/main" r:id="rId2"/>
-              </a:ext>
-            </a:extLst>
-          </a:blip>
-          <a:stretch>
-            <a:fillRect/>
-          </a:stretch>
-        </p:blipFill>
-        <p:spPr>
-          <a:xfrm>
-            <a:off x="6830589" y="1517232"/>
-            <a:ext cx="2601735" cy="2462976"/>
-          </a:xfrm>
-          <a:prstGeom prst="rect">
-            <a:avLst/>
-          </a:prstGeom>
-        </p:spPr>
-      </p:pic>
       <p:sp>
         <p:nvSpPr>
           <p:cNvPr id="15" name="TextBox 14">
@@ -9168,18 +8961,13 @@
               </a:spcAft>
             </a:pPr>
             <a:r>
-              <a:rPr lang="en-CA" sz="2400" b="1" dirty="0">
+              <a:rPr lang="en-US" sz="2400" b="1" dirty="0">
                 <a:solidFill>
                   <a:schemeClr val="bg1"/>
                 </a:solidFill>
               </a:rPr>
-              <a:t>John Doe</a:t>
-            </a:r>
-            <a:endParaRPr lang="en-US" sz="2400" b="1" dirty="0" err="1">
-              <a:solidFill>
-                <a:schemeClr val="bg1"/>
-              </a:solidFill>
-            </a:endParaRPr>
+              <a:t>Juan Martinez</a:t>
+            </a:r>
           </a:p>
         </p:txBody>
       </p:sp>
@@ -9197,8 +8985,8 @@
         </p:nvSpPr>
         <p:spPr>
           <a:xfrm>
-            <a:off x="6627340" y="4617493"/>
-            <a:ext cx="3343140" cy="1446550"/>
+            <a:off x="6096000" y="4581590"/>
+            <a:ext cx="5771028" cy="960263"/>
           </a:xfrm>
           <a:prstGeom prst="rect">
             <a:avLst/>
@@ -9225,43 +9013,37 @@
                   <a:schemeClr val="bg1"/>
                 </a:solidFill>
               </a:rPr>
-              <a:t>Twitter:</a:t>
-            </a:r>
-          </a:p>
-          <a:p>
-            <a:pPr>
-              <a:lnSpc>
-                <a:spcPct val="90000"/>
-              </a:lnSpc>
-              <a:spcAft>
-                <a:spcPts val="600"/>
-              </a:spcAft>
-            </a:pPr>
+              <a:t>Other: </a:t>
+            </a:r>
             <a:r>
               <a:rPr lang="en-CA" sz="2400" dirty="0">
                 <a:solidFill>
                   <a:schemeClr val="bg1"/>
                 </a:solidFill>
+                <a:hlinkClick r:id="rId4">
+                  <a:extLst>
+                    <a:ext uri="{A12FA001-AC4F-418D-AE19-62706E023703}">
+                      <ahyp:hlinkClr xmlns:ahyp="http://schemas.microsoft.com/office/drawing/2018/hyperlinkcolor" val="tx"/>
+                    </a:ext>
+                  </a:extLst>
+                </a:hlinkClick>
               </a:rPr>
-              <a:t>Blog: </a:t>
-            </a:r>
-          </a:p>
-          <a:p>
-            <a:pPr>
-              <a:lnSpc>
-                <a:spcPct val="90000"/>
-              </a:lnSpc>
-              <a:spcAft>
-                <a:spcPts val="600"/>
-              </a:spcAft>
-            </a:pPr>
-            <a:r>
-              <a:rPr lang="en-CA" sz="2400" dirty="0">
+              <a:t>linkedin.com/in/</a:t>
+            </a:r>
+            <a:r>
+              <a:rPr lang="en-CA" sz="2400" dirty="0" err="1">
                 <a:solidFill>
                   <a:schemeClr val="bg1"/>
                 </a:solidFill>
+                <a:hlinkClick r:id="rId4">
+                  <a:extLst>
+                    <a:ext uri="{A12FA001-AC4F-418D-AE19-62706E023703}">
+                      <ahyp:hlinkClr xmlns:ahyp="http://schemas.microsoft.com/office/drawing/2018/hyperlinkcolor" val="tx"/>
+                    </a:ext>
+                  </a:extLst>
+                </a:hlinkClick>
               </a:rPr>
-              <a:t>Other:</a:t>
+              <a:t>juancarlosmartinez</a:t>
             </a:r>
             <a:endParaRPr lang="en-US" sz="2400" dirty="0" err="1">
               <a:solidFill>
@@ -9271,6 +9053,100 @@
           </a:p>
         </p:txBody>
       </p:sp>
+      <p:pic>
+        <p:nvPicPr>
+          <p:cNvPr id="1026" name="Picture 2" descr="https://pbs.twimg.com/profile_images/1108516004932608003/g6aTVrxL_400x400.jpg">
+            <a:extLst>
+              <a:ext uri="{FF2B5EF4-FFF2-40B4-BE49-F238E27FC236}">
+                <a16:creationId xmlns:a16="http://schemas.microsoft.com/office/drawing/2014/main" id="{C7515476-AE22-4A56-A403-17C1878CB6FB}"/>
+              </a:ext>
+            </a:extLst>
+          </p:cNvPr>
+          <p:cNvPicPr>
+            <a:picLocks noChangeAspect="1" noChangeArrowheads="1"/>
+          </p:cNvPicPr>
+          <p:nvPr/>
+        </p:nvPicPr>
+        <p:blipFill>
+          <a:blip r:embed="rId5">
+            <a:extLst>
+              <a:ext uri="{28A0092B-C50C-407E-A947-70E740481C1C}">
+                <a14:useLocalDpi xmlns:a14="http://schemas.microsoft.com/office/drawing/2010/main" val="0"/>
+              </a:ext>
+            </a:extLst>
+          </a:blip>
+          <a:srcRect/>
+          <a:stretch>
+            <a:fillRect/>
+          </a:stretch>
+        </p:blipFill>
+        <p:spPr bwMode="auto">
+          <a:xfrm>
+            <a:off x="986921" y="1517233"/>
+            <a:ext cx="2468974" cy="2468974"/>
+          </a:xfrm>
+          <a:prstGeom prst="rect">
+            <a:avLst/>
+          </a:prstGeom>
+          <a:noFill/>
+          <a:extLst>
+            <a:ext uri="{909E8E84-426E-40DD-AFC4-6F175D3DCCD1}">
+              <a14:hiddenFill xmlns:a14="http://schemas.microsoft.com/office/drawing/2010/main">
+                <a:solidFill>
+                  <a:srgbClr val="FFFFFF"/>
+                </a:solidFill>
+              </a14:hiddenFill>
+            </a:ext>
+          </a:extLst>
+        </p:spPr>
+      </p:pic>
+      <p:pic>
+        <p:nvPicPr>
+          <p:cNvPr id="1028" name="Picture 4" descr="Juan Martinez">
+            <a:extLst>
+              <a:ext uri="{FF2B5EF4-FFF2-40B4-BE49-F238E27FC236}">
+                <a16:creationId xmlns:a16="http://schemas.microsoft.com/office/drawing/2014/main" id="{FA3290A1-2AAF-4A49-B64A-8753AD298460}"/>
+              </a:ext>
+            </a:extLst>
+          </p:cNvPr>
+          <p:cNvPicPr>
+            <a:picLocks noChangeAspect="1" noChangeArrowheads="1"/>
+          </p:cNvPicPr>
+          <p:nvPr/>
+        </p:nvPicPr>
+        <p:blipFill>
+          <a:blip r:embed="rId6">
+            <a:extLst>
+              <a:ext uri="{28A0092B-C50C-407E-A947-70E740481C1C}">
+                <a14:useLocalDpi xmlns:a14="http://schemas.microsoft.com/office/drawing/2010/main" val="0"/>
+              </a:ext>
+            </a:extLst>
+          </a:blip>
+          <a:srcRect/>
+          <a:stretch>
+            <a:fillRect/>
+          </a:stretch>
+        </p:blipFill>
+        <p:spPr bwMode="auto">
+          <a:xfrm>
+            <a:off x="6627340" y="1520162"/>
+            <a:ext cx="2460046" cy="2460046"/>
+          </a:xfrm>
+          <a:prstGeom prst="rect">
+            <a:avLst/>
+          </a:prstGeom>
+          <a:noFill/>
+          <a:extLst>
+            <a:ext uri="{909E8E84-426E-40DD-AFC4-6F175D3DCCD1}">
+              <a14:hiddenFill xmlns:a14="http://schemas.microsoft.com/office/drawing/2010/main">
+                <a:solidFill>
+                  <a:srgbClr val="FFFFFF"/>
+                </a:solidFill>
+              </a14:hiddenFill>
+            </a:ext>
+          </a:extLst>
+        </p:spPr>
+      </p:pic>
     </p:spTree>
     <p:extLst>
       <p:ext uri="{BB962C8B-B14F-4D97-AF65-F5344CB8AC3E}">
@@ -9696,45 +9572,6 @@
           </a:p>
         </p:txBody>
       </p:sp>
-      <p:pic>
-        <p:nvPicPr>
-          <p:cNvPr id="14" name="Picture 13">
-            <a:extLst>
-              <a:ext uri="{FF2B5EF4-FFF2-40B4-BE49-F238E27FC236}">
-                <a16:creationId xmlns:a16="http://schemas.microsoft.com/office/drawing/2014/main" id="{BBDA2106-596F-47CD-A5B0-7B7626A220FC}"/>
-              </a:ext>
-            </a:extLst>
-          </p:cNvPr>
-          <p:cNvPicPr>
-            <a:picLocks noChangeAspect="1"/>
-          </p:cNvPicPr>
-          <p:nvPr/>
-        </p:nvPicPr>
-        <p:blipFill>
-          <a:blip r:embed="rId4">
-            <a:extLst>
-              <a:ext uri="{28A0092B-C50C-407E-A947-70E740481C1C}">
-                <a14:useLocalDpi xmlns:a14="http://schemas.microsoft.com/office/drawing/2010/main" val="0"/>
-              </a:ext>
-              <a:ext uri="{837473B0-CC2E-450A-ABE3-18F120FF3D39}">
-                <a1611:picAttrSrcUrl xmlns:a1611="http://schemas.microsoft.com/office/drawing/2016/11/main" r:id="rId2"/>
-              </a:ext>
-            </a:extLst>
-          </a:blip>
-          <a:stretch>
-            <a:fillRect/>
-          </a:stretch>
-        </p:blipFill>
-        <p:spPr>
-          <a:xfrm>
-            <a:off x="6830589" y="1517232"/>
-            <a:ext cx="2601735" cy="2462976"/>
-          </a:xfrm>
-          <a:prstGeom prst="rect">
-            <a:avLst/>
-          </a:prstGeom>
-        </p:spPr>
-      </p:pic>
       <p:sp>
         <p:nvSpPr>
           <p:cNvPr id="15" name="TextBox 14">
@@ -9777,7 +9614,7 @@
                   <a:schemeClr val="bg1"/>
                 </a:solidFill>
               </a:rPr>
-              <a:t>John Doe</a:t>
+              <a:t>Ahmed Al-Asaad</a:t>
             </a:r>
             <a:endParaRPr lang="en-US" sz="2400" b="1" dirty="0" err="1">
               <a:solidFill>
@@ -9802,7 +9639,7 @@
         <p:spPr>
           <a:xfrm>
             <a:off x="6627340" y="4617493"/>
-            <a:ext cx="3343140" cy="1446550"/>
+            <a:ext cx="4801312" cy="1037207"/>
           </a:xfrm>
           <a:prstGeom prst="rect">
             <a:avLst/>
@@ -9829,8 +9666,21 @@
                   <a:schemeClr val="bg1"/>
                 </a:solidFill>
               </a:rPr>
-              <a:t>Twitter:</a:t>
-            </a:r>
+              <a:t>Twitter: </a:t>
+            </a:r>
+            <a:r>
+              <a:rPr lang="en-CA" sz="2400" dirty="0" err="1">
+                <a:solidFill>
+                  <a:schemeClr val="bg1"/>
+                </a:solidFill>
+              </a:rPr>
+              <a:t>AhmedAlAsaad</a:t>
+            </a:r>
+            <a:endParaRPr lang="en-CA" sz="2400" dirty="0">
+              <a:solidFill>
+                <a:schemeClr val="bg1"/>
+              </a:solidFill>
+            </a:endParaRPr>
           </a:p>
           <a:p>
             <a:pPr>
@@ -9847,25 +9697,7 @@
                   <a:schemeClr val="bg1"/>
                 </a:solidFill>
               </a:rPr>
-              <a:t>Blog: </a:t>
-            </a:r>
-          </a:p>
-          <a:p>
-            <a:pPr>
-              <a:lnSpc>
-                <a:spcPct val="90000"/>
-              </a:lnSpc>
-              <a:spcAft>
-                <a:spcPts val="600"/>
-              </a:spcAft>
-            </a:pPr>
-            <a:r>
-              <a:rPr lang="en-CA" sz="2400" dirty="0">
-                <a:solidFill>
-                  <a:schemeClr val="bg1"/>
-                </a:solidFill>
-              </a:rPr>
-              <a:t>Other:</a:t>
+              <a:t>Other: lajak.com</a:t>
             </a:r>
             <a:endParaRPr lang="en-US" sz="2400" dirty="0" err="1">
               <a:solidFill>
@@ -9890,7 +9722,7 @@
           <p:nvPr/>
         </p:nvPicPr>
         <p:blipFill>
-          <a:blip r:embed="rId5" cstate="print">
+          <a:blip r:embed="rId4" cstate="print">
             <a:extLst>
               <a:ext uri="{28A0092B-C50C-407E-A947-70E740481C1C}">
                 <a14:useLocalDpi xmlns:a14="http://schemas.microsoft.com/office/drawing/2010/main" val="0"/>
@@ -9909,6 +9741,53 @@
           <a:prstGeom prst="rect">
             <a:avLst/>
           </a:prstGeom>
+        </p:spPr>
+      </p:pic>
+      <p:pic>
+        <p:nvPicPr>
+          <p:cNvPr id="2050" name="Picture 2" descr="https://pbs.twimg.com/profile_images/1661766245/6285100391_1f9fb9841c_o2_400x400.jpg">
+            <a:extLst>
+              <a:ext uri="{FF2B5EF4-FFF2-40B4-BE49-F238E27FC236}">
+                <a16:creationId xmlns:a16="http://schemas.microsoft.com/office/drawing/2014/main" id="{468ABC17-49F2-46C2-ABBC-15A49696B11E}"/>
+              </a:ext>
+            </a:extLst>
+          </p:cNvPr>
+          <p:cNvPicPr>
+            <a:picLocks noChangeAspect="1" noChangeArrowheads="1"/>
+          </p:cNvPicPr>
+          <p:nvPr/>
+        </p:nvPicPr>
+        <p:blipFill>
+          <a:blip r:embed="rId5">
+            <a:extLst>
+              <a:ext uri="{28A0092B-C50C-407E-A947-70E740481C1C}">
+                <a14:useLocalDpi xmlns:a14="http://schemas.microsoft.com/office/drawing/2010/main" val="0"/>
+              </a:ext>
+            </a:extLst>
+          </a:blip>
+          <a:srcRect/>
+          <a:stretch>
+            <a:fillRect/>
+          </a:stretch>
+        </p:blipFill>
+        <p:spPr bwMode="auto">
+          <a:xfrm>
+            <a:off x="6723528" y="1585548"/>
+            <a:ext cx="2326341" cy="2326341"/>
+          </a:xfrm>
+          <a:prstGeom prst="rect">
+            <a:avLst/>
+          </a:prstGeom>
+          <a:noFill/>
+          <a:extLst>
+            <a:ext uri="{909E8E84-426E-40DD-AFC4-6F175D3DCCD1}">
+              <a14:hiddenFill xmlns:a14="http://schemas.microsoft.com/office/drawing/2010/main">
+                <a:solidFill>
+                  <a:srgbClr val="FFFFFF"/>
+                </a:solidFill>
+              </a14:hiddenFill>
+            </a:ext>
+          </a:extLst>
         </p:spPr>
       </p:pic>
     </p:spTree>
@@ -10142,22 +10021,8 @@
                   <a:schemeClr val="bg1"/>
                 </a:solidFill>
               </a:rPr>
-              <a:t>Twitter: </a:t>
-            </a:r>
-            <a:r>
-              <a:rPr lang="en-CA" sz="2400" dirty="0">
-                <a:solidFill>
-                  <a:schemeClr val="bg1"/>
-                </a:solidFill>
-                <a:hlinkClick r:id="rId4"/>
-              </a:rPr>
-              <a:t>vchevallier</a:t>
-            </a:r>
-            <a:endParaRPr lang="en-CA" sz="2400" dirty="0">
-              <a:solidFill>
-                <a:schemeClr val="bg1"/>
-              </a:solidFill>
-            </a:endParaRPr>
+              <a:t>Twitter: vchevallier</a:t>
+            </a:r>
           </a:p>
           <a:p>
             <a:pPr>
@@ -10174,201 +10039,8 @@
                   <a:schemeClr val="bg1"/>
                 </a:solidFill>
               </a:rPr>
-              <a:t>Blog: 	  </a:t>
-            </a:r>
-            <a:r>
-              <a:rPr lang="en-CA" sz="2400" dirty="0">
-                <a:solidFill>
-                  <a:schemeClr val="bg1"/>
-                </a:solidFill>
-                <a:hlinkClick r:id="rId5"/>
-              </a:rPr>
-              <a:t>www.vivien-chevallier.com</a:t>
-            </a:r>
-            <a:endParaRPr lang="en-CA" sz="2400" dirty="0">
-              <a:solidFill>
-                <a:schemeClr val="bg1"/>
-              </a:solidFill>
-            </a:endParaRPr>
-          </a:p>
-        </p:txBody>
-      </p:sp>
-      <p:pic>
-        <p:nvPicPr>
-          <p:cNvPr id="14" name="Picture 13">
-            <a:extLst>
-              <a:ext uri="{FF2B5EF4-FFF2-40B4-BE49-F238E27FC236}">
-                <a16:creationId xmlns:a16="http://schemas.microsoft.com/office/drawing/2014/main" id="{BBDA2106-596F-47CD-A5B0-7B7626A220FC}"/>
-              </a:ext>
-            </a:extLst>
-          </p:cNvPr>
-          <p:cNvPicPr>
-            <a:picLocks noChangeAspect="1"/>
-          </p:cNvPicPr>
-          <p:nvPr/>
-        </p:nvPicPr>
-        <p:blipFill>
-          <a:blip r:embed="rId6">
-            <a:extLst>
-              <a:ext uri="{28A0092B-C50C-407E-A947-70E740481C1C}">
-                <a14:useLocalDpi xmlns:a14="http://schemas.microsoft.com/office/drawing/2010/main" val="0"/>
-              </a:ext>
-              <a:ext uri="{837473B0-CC2E-450A-ABE3-18F120FF3D39}">
-                <a1611:picAttrSrcUrl xmlns:a1611="http://schemas.microsoft.com/office/drawing/2016/11/main" r:id="rId2"/>
-              </a:ext>
-            </a:extLst>
-          </a:blip>
-          <a:stretch>
-            <a:fillRect/>
-          </a:stretch>
-        </p:blipFill>
-        <p:spPr>
-          <a:xfrm>
-            <a:off x="6830589" y="1517232"/>
-            <a:ext cx="2601735" cy="2462976"/>
-          </a:xfrm>
-          <a:prstGeom prst="rect">
-            <a:avLst/>
-          </a:prstGeom>
-        </p:spPr>
-      </p:pic>
-      <p:sp>
-        <p:nvSpPr>
-          <p:cNvPr id="15" name="TextBox 14">
-            <a:extLst>
-              <a:ext uri="{FF2B5EF4-FFF2-40B4-BE49-F238E27FC236}">
-                <a16:creationId xmlns:a16="http://schemas.microsoft.com/office/drawing/2014/main" id="{85D7B070-0B80-4B92-81B9-E115FB94A0F2}"/>
-              </a:ext>
-            </a:extLst>
-          </p:cNvPr>
-          <p:cNvSpPr txBox="1"/>
-          <p:nvPr/>
-        </p:nvSpPr>
-        <p:spPr>
-          <a:xfrm>
-            <a:off x="6627340" y="3980208"/>
-            <a:ext cx="3546389" cy="627864"/>
-          </a:xfrm>
-          <a:prstGeom prst="rect">
-            <a:avLst/>
-          </a:prstGeom>
-          <a:noFill/>
-        </p:spPr>
-        <p:txBody>
-          <a:bodyPr wrap="square" lIns="182880" tIns="146304" rIns="182880" bIns="146304" rtlCol="0">
-            <a:spAutoFit/>
-          </a:bodyPr>
-          <a:lstStyle/>
-          <a:p>
-            <a:pPr>
-              <a:lnSpc>
-                <a:spcPct val="90000"/>
-              </a:lnSpc>
-              <a:spcAft>
-                <a:spcPts val="600"/>
-              </a:spcAft>
-            </a:pPr>
-            <a:r>
-              <a:rPr lang="en-CA" sz="2400" b="1" dirty="0">
-                <a:solidFill>
-                  <a:schemeClr val="bg1"/>
-                </a:solidFill>
-              </a:rPr>
-              <a:t>John Doe</a:t>
-            </a:r>
-            <a:endParaRPr lang="en-US" sz="2400" b="1" dirty="0" err="1">
-              <a:solidFill>
-                <a:schemeClr val="bg1"/>
-              </a:solidFill>
-            </a:endParaRPr>
-          </a:p>
-        </p:txBody>
-      </p:sp>
-      <p:sp>
-        <p:nvSpPr>
-          <p:cNvPr id="16" name="TextBox 15">
-            <a:extLst>
-              <a:ext uri="{FF2B5EF4-FFF2-40B4-BE49-F238E27FC236}">
-                <a16:creationId xmlns:a16="http://schemas.microsoft.com/office/drawing/2014/main" id="{ED9169BA-311E-4F62-B0D5-3CA1ABA7C549}"/>
-              </a:ext>
-            </a:extLst>
-          </p:cNvPr>
-          <p:cNvSpPr txBox="1"/>
-          <p:nvPr/>
-        </p:nvSpPr>
-        <p:spPr>
-          <a:xfrm>
-            <a:off x="6627340" y="4617493"/>
-            <a:ext cx="3343140" cy="1446550"/>
-          </a:xfrm>
-          <a:prstGeom prst="rect">
-            <a:avLst/>
-          </a:prstGeom>
-          <a:noFill/>
-        </p:spPr>
-        <p:txBody>
-          <a:bodyPr wrap="square" lIns="182880" tIns="146304" rIns="182880" bIns="146304" rtlCol="0">
-            <a:spAutoFit/>
-          </a:bodyPr>
-          <a:lstStyle/>
-          <a:p>
-            <a:pPr>
-              <a:lnSpc>
-                <a:spcPct val="90000"/>
-              </a:lnSpc>
-              <a:spcAft>
-                <a:spcPts val="600"/>
-              </a:spcAft>
-            </a:pPr>
-            <a:r>
-              <a:rPr lang="en-CA" sz="2400" dirty="0">
-                <a:solidFill>
-                  <a:schemeClr val="bg1"/>
-                </a:solidFill>
-              </a:rPr>
-              <a:t>Twitter:</a:t>
-            </a:r>
-          </a:p>
-          <a:p>
-            <a:pPr>
-              <a:lnSpc>
-                <a:spcPct val="90000"/>
-              </a:lnSpc>
-              <a:spcAft>
-                <a:spcPts val="600"/>
-              </a:spcAft>
-            </a:pPr>
-            <a:r>
-              <a:rPr lang="en-CA" sz="2400" dirty="0">
-                <a:solidFill>
-                  <a:schemeClr val="bg1"/>
-                </a:solidFill>
-              </a:rPr>
-              <a:t>Blog: </a:t>
-            </a:r>
-          </a:p>
-          <a:p>
-            <a:pPr>
-              <a:lnSpc>
-                <a:spcPct val="90000"/>
-              </a:lnSpc>
-              <a:spcAft>
-                <a:spcPts val="600"/>
-              </a:spcAft>
-            </a:pPr>
-            <a:r>
-              <a:rPr lang="en-CA" sz="2400" dirty="0">
-                <a:solidFill>
-                  <a:schemeClr val="bg1"/>
-                </a:solidFill>
-              </a:rPr>
-              <a:t>Other:</a:t>
-            </a:r>
-            <a:endParaRPr lang="en-US" sz="2400" dirty="0" err="1">
-              <a:solidFill>
-                <a:schemeClr val="bg1"/>
-              </a:solidFill>
-            </a:endParaRPr>
+              <a:t>Blog: 	 vivien-chevallier.com</a:t>
+            </a:r>
           </a:p>
         </p:txBody>
       </p:sp>
@@ -10387,7 +10059,7 @@
           <p:nvPr/>
         </p:nvPicPr>
         <p:blipFill>
-          <a:blip r:embed="rId7" cstate="print">
+          <a:blip r:embed="rId4" cstate="print">
             <a:extLst>
               <a:ext uri="{28A0092B-C50C-407E-A947-70E740481C1C}">
                 <a14:useLocalDpi xmlns:a14="http://schemas.microsoft.com/office/drawing/2010/main" val="0"/>
@@ -10408,6 +10080,203 @@
           </a:prstGeom>
         </p:spPr>
       </p:pic>
+      <p:pic>
+        <p:nvPicPr>
+          <p:cNvPr id="10" name="Picture 9">
+            <a:extLst>
+              <a:ext uri="{FF2B5EF4-FFF2-40B4-BE49-F238E27FC236}">
+                <a16:creationId xmlns:a16="http://schemas.microsoft.com/office/drawing/2014/main" id="{0E2E690C-C612-4D26-B430-A38B9C9C4BA6}"/>
+              </a:ext>
+            </a:extLst>
+          </p:cNvPr>
+          <p:cNvPicPr>
+            <a:picLocks noChangeAspect="1"/>
+          </p:cNvPicPr>
+          <p:nvPr/>
+        </p:nvPicPr>
+        <p:blipFill>
+          <a:blip r:embed="rId5">
+            <a:extLst>
+              <a:ext uri="{28A0092B-C50C-407E-A947-70E740481C1C}">
+                <a14:useLocalDpi xmlns:a14="http://schemas.microsoft.com/office/drawing/2010/main" val="0"/>
+              </a:ext>
+            </a:extLst>
+          </a:blip>
+          <a:stretch>
+            <a:fillRect/>
+          </a:stretch>
+        </p:blipFill>
+        <p:spPr>
+          <a:xfrm>
+            <a:off x="6759861" y="1628886"/>
+            <a:ext cx="2462976" cy="2462976"/>
+          </a:xfrm>
+          <a:prstGeom prst="rect">
+            <a:avLst/>
+          </a:prstGeom>
+        </p:spPr>
+      </p:pic>
+      <p:sp>
+        <p:nvSpPr>
+          <p:cNvPr id="11" name="TextBox 10">
+            <a:extLst>
+              <a:ext uri="{FF2B5EF4-FFF2-40B4-BE49-F238E27FC236}">
+                <a16:creationId xmlns:a16="http://schemas.microsoft.com/office/drawing/2014/main" id="{A214EEA9-A672-4609-8155-B23F5E5285C3}"/>
+              </a:ext>
+            </a:extLst>
+          </p:cNvPr>
+          <p:cNvSpPr txBox="1"/>
+          <p:nvPr/>
+        </p:nvSpPr>
+        <p:spPr>
+          <a:xfrm>
+            <a:off x="6487233" y="4091862"/>
+            <a:ext cx="3546389" cy="627864"/>
+          </a:xfrm>
+          <a:prstGeom prst="rect">
+            <a:avLst/>
+          </a:prstGeom>
+          <a:noFill/>
+        </p:spPr>
+        <p:txBody>
+          <a:bodyPr wrap="square" lIns="182880" tIns="146304" rIns="182880" bIns="146304" rtlCol="0">
+            <a:spAutoFit/>
+          </a:bodyPr>
+          <a:lstStyle/>
+          <a:p>
+            <a:pPr>
+              <a:lnSpc>
+                <a:spcPct val="90000"/>
+              </a:lnSpc>
+              <a:spcAft>
+                <a:spcPts val="600"/>
+              </a:spcAft>
+            </a:pPr>
+            <a:r>
+              <a:rPr lang="en-CA" sz="2400" b="1" dirty="0">
+                <a:solidFill>
+                  <a:schemeClr val="bg1"/>
+                </a:solidFill>
+              </a:rPr>
+              <a:t>Carl-Hugo Marcotte</a:t>
+            </a:r>
+            <a:endParaRPr lang="en-US" sz="2400" b="1" dirty="0" err="1">
+              <a:solidFill>
+                <a:schemeClr val="bg1"/>
+              </a:solidFill>
+            </a:endParaRPr>
+          </a:p>
+        </p:txBody>
+      </p:sp>
+      <p:sp>
+        <p:nvSpPr>
+          <p:cNvPr id="17" name="TextBox 16">
+            <a:extLst>
+              <a:ext uri="{FF2B5EF4-FFF2-40B4-BE49-F238E27FC236}">
+                <a16:creationId xmlns:a16="http://schemas.microsoft.com/office/drawing/2014/main" id="{DFE32EE4-4D33-494A-929D-582C9E37E35C}"/>
+              </a:ext>
+            </a:extLst>
+          </p:cNvPr>
+          <p:cNvSpPr txBox="1"/>
+          <p:nvPr/>
+        </p:nvSpPr>
+        <p:spPr>
+          <a:xfrm>
+            <a:off x="6487232" y="4729147"/>
+            <a:ext cx="5762368" cy="1446550"/>
+          </a:xfrm>
+          <a:prstGeom prst="rect">
+            <a:avLst/>
+          </a:prstGeom>
+          <a:noFill/>
+        </p:spPr>
+        <p:txBody>
+          <a:bodyPr wrap="square" lIns="182880" tIns="146304" rIns="182880" bIns="146304" rtlCol="0">
+            <a:spAutoFit/>
+          </a:bodyPr>
+          <a:lstStyle/>
+          <a:p>
+            <a:pPr>
+              <a:lnSpc>
+                <a:spcPct val="90000"/>
+              </a:lnSpc>
+              <a:spcAft>
+                <a:spcPts val="600"/>
+              </a:spcAft>
+            </a:pPr>
+            <a:r>
+              <a:rPr lang="en-CA" sz="2400" dirty="0">
+                <a:solidFill>
+                  <a:schemeClr val="bg1"/>
+                </a:solidFill>
+              </a:rPr>
+              <a:t>Twitter: </a:t>
+            </a:r>
+            <a:r>
+              <a:rPr lang="en-CA" sz="2400" dirty="0" err="1">
+                <a:solidFill>
+                  <a:schemeClr val="bg1"/>
+                </a:solidFill>
+              </a:rPr>
+              <a:t>CarlHugoM</a:t>
+            </a:r>
+            <a:endParaRPr lang="en-CA" sz="2400" dirty="0">
+              <a:solidFill>
+                <a:schemeClr val="bg1"/>
+              </a:solidFill>
+            </a:endParaRPr>
+          </a:p>
+          <a:p>
+            <a:pPr>
+              <a:lnSpc>
+                <a:spcPct val="90000"/>
+              </a:lnSpc>
+              <a:spcAft>
+                <a:spcPts val="600"/>
+              </a:spcAft>
+            </a:pPr>
+            <a:r>
+              <a:rPr lang="en-CA" sz="2400" dirty="0">
+                <a:solidFill>
+                  <a:schemeClr val="bg1"/>
+                </a:solidFill>
+              </a:rPr>
+              <a:t>Blog:    </a:t>
+            </a:r>
+            <a:r>
+              <a:rPr lang="en-US" sz="2400" dirty="0">
+                <a:solidFill>
+                  <a:schemeClr val="bg1"/>
+                </a:solidFill>
+              </a:rPr>
+              <a:t>forevolve.com</a:t>
+            </a:r>
+          </a:p>
+          <a:p>
+            <a:pPr>
+              <a:lnSpc>
+                <a:spcPct val="90000"/>
+              </a:lnSpc>
+              <a:spcAft>
+                <a:spcPts val="600"/>
+              </a:spcAft>
+            </a:pPr>
+            <a:r>
+              <a:rPr lang="en-US" sz="2400" dirty="0">
+                <a:solidFill>
+                  <a:schemeClr val="bg1"/>
+                </a:solidFill>
+              </a:rPr>
+              <a:t>Other:  github.com/Carl-Hugo</a:t>
+            </a:r>
+            <a:endParaRPr lang="en-CA" sz="2400" dirty="0">
+              <a:solidFill>
+                <a:schemeClr val="bg1"/>
+              </a:solidFill>
+            </a:endParaRPr>
+          </a:p>
+        </p:txBody>
+      </p:sp>
     </p:spTree>
     <p:extLst>
       <p:ext uri="{BB962C8B-B14F-4D97-AF65-F5344CB8AC3E}">
@@ -10441,496 +10310,104 @@
           <a:chExt cx="0" cy="0"/>
         </a:xfrm>
       </p:grpSpPr>
-      <p:sp>
-        <p:nvSpPr>
-          <p:cNvPr id="4" name="Title 4"/>
-          <p:cNvSpPr txBox="1">
-            <a:spLocks/>
-          </p:cNvSpPr>
-          <p:nvPr/>
-        </p:nvSpPr>
-        <p:spPr>
-          <a:xfrm>
-            <a:off x="344245" y="382364"/>
-            <a:ext cx="11034712" cy="1876425"/>
-          </a:xfrm>
-          <a:prstGeom prst="rect">
-            <a:avLst/>
-          </a:prstGeom>
-        </p:spPr>
-        <p:txBody>
-          <a:bodyPr>
-            <a:normAutofit/>
-          </a:bodyPr>
-          <a:lstStyle>
-            <a:lvl1pPr algn="l" defTabSz="914180" rtl="0" eaLnBrk="1" latinLnBrk="0" hangingPunct="1">
-              <a:lnSpc>
-                <a:spcPct val="90000"/>
-              </a:lnSpc>
-              <a:spcBef>
-                <a:spcPct val="0"/>
-              </a:spcBef>
-              <a:buNone/>
-              <a:defRPr lang="en-US" sz="5293" b="0" kern="1200" cap="none" spc="-100" baseline="0" dirty="0" smtClean="0">
-                <a:ln w="3175">
-                  <a:noFill/>
-                </a:ln>
-                <a:solidFill>
-                  <a:schemeClr val="bg1"/>
-                </a:solidFill>
-                <a:effectLst/>
-                <a:latin typeface="+mj-lt"/>
-                <a:ea typeface="+mn-ea"/>
-                <a:cs typeface="Segoe UI" pitchFamily="34" charset="0"/>
-              </a:defRPr>
-            </a:lvl1pPr>
-          </a:lstStyle>
-          <a:p>
-            <a:r>
-              <a:rPr lang="en-CA" sz="6600" dirty="0">
-                <a:solidFill>
-                  <a:schemeClr val="bg2"/>
-                </a:solidFill>
-              </a:rPr>
-              <a:t>Speakers</a:t>
-            </a:r>
-          </a:p>
-        </p:txBody>
-      </p:sp>
-      <p:sp>
-        <p:nvSpPr>
-          <p:cNvPr id="6" name="TextBox 5">
+      <p:pic>
+        <p:nvPicPr>
+          <p:cNvPr id="1026" name="Picture 2" descr="https://lh3.googleusercontent.com/jFbz8dCsUsy8hbvwNNkfDOrTH6FYWns5DzmTM1wHovBRvqRmS1owruXZ2jkahQbWexwZoyoqxi83pnwUkf4hORBAgn2FOMn4_xbD4NNinCJOiasYFGBZ3X8VTf3bQcllLNKRQjxgZ55zDABou-YyddJ0r0qJorLH-AEYcN8K1Lfzu2bnAWKwMe3klZnjez7OTSyn4Yn1CD0mcadMI_ToG18RaKIrODHceF48W1u1wWIwri4JYOicVNaCoYRohALgN6cGbrRao7BvSvvQJqQjELQ_4acNnzFoIe7DsEcK2JSW8UYVyfak4V6SH0GDZZOaXex4q-zsOdg0V18oRsHZ5yZg6J1QfZOtMOxvBqw1a-6yG7U3SwUXYnnYUtludbwQWXw1JeQRg0eVgGtU4uKKP_8lUKahw2fZVQe-s3fELqgAY4QSuAGAJEsYpYsqSBjkq8BESrlLUd_kOZ26_inA_mZoFOmDQixQ1AMjlIYXsCoA0N3MPnwaB8pQzNqcUyQhkwgYytfoE4bKBhtzg3-gdHd6-YMpr_CqfDJO2IYZ0fRdwkCxNs4u0YpxpjcPRjeNEpn0_schcxvahNyGQP42_pTprKmCHE_eHcsxW8-Ikf9mQYsuLnykC3rC5fVjjv_VK-fLqM2IJtAOakNJ3pr89RDZlOe9k8Z2=w980-h735-no">
             <a:extLst>
               <a:ext uri="{FF2B5EF4-FFF2-40B4-BE49-F238E27FC236}">
-                <a16:creationId xmlns:a16="http://schemas.microsoft.com/office/drawing/2014/main" id="{5C2BCF1B-D436-4062-BDE8-8243B3F9F5BD}"/>
-              </a:ext>
-            </a:extLst>
-          </p:cNvPr>
-          <p:cNvSpPr txBox="1"/>
-          <p:nvPr/>
-        </p:nvSpPr>
-        <p:spPr>
-          <a:xfrm>
-            <a:off x="8681580" y="6475636"/>
-            <a:ext cx="5394754" cy="433965"/>
-          </a:xfrm>
-          <a:prstGeom prst="rect">
-            <a:avLst/>
-          </a:prstGeom>
-          <a:noFill/>
-        </p:spPr>
-        <p:txBody>
-          <a:bodyPr wrap="square" lIns="182880" tIns="146304" rIns="182880" bIns="146304" rtlCol="0">
-            <a:spAutoFit/>
-          </a:bodyPr>
-          <a:lstStyle/>
-          <a:p>
-            <a:r>
-              <a:rPr lang="en-US" sz="900" dirty="0">
-                <a:hlinkClick r:id="rId2" tooltip="http://www.slenquirer.com/2012/11/sle-promotes-healthy-eating-despite.html"/>
-              </a:rPr>
-              <a:t>This Photo</a:t>
-            </a:r>
-            <a:r>
-              <a:rPr lang="en-US" sz="900" dirty="0"/>
-              <a:t> by Unknown Author is licensed under </a:t>
-            </a:r>
-            <a:r>
-              <a:rPr lang="en-US" sz="900" dirty="0">
-                <a:hlinkClick r:id="rId3" tooltip="https://creativecommons.org/licenses/by-nc-sa/3.0/"/>
-              </a:rPr>
-              <a:t>CC BY-SA-NC</a:t>
-            </a:r>
-            <a:endParaRPr lang="en-US" sz="900" dirty="0"/>
-          </a:p>
-        </p:txBody>
-      </p:sp>
-      <p:pic>
-        <p:nvPicPr>
-          <p:cNvPr id="11" name="Picture 10">
-            <a:extLst>
-              <a:ext uri="{FF2B5EF4-FFF2-40B4-BE49-F238E27FC236}">
-                <a16:creationId xmlns:a16="http://schemas.microsoft.com/office/drawing/2014/main" id="{1961063A-2840-49EA-90C3-C5B9428C2DD7}"/>
+                <a16:creationId xmlns:a16="http://schemas.microsoft.com/office/drawing/2014/main" id="{48638A12-BB87-4EBC-AA83-483B1AA6E1C9}"/>
               </a:ext>
             </a:extLst>
           </p:cNvPr>
           <p:cNvPicPr>
-            <a:picLocks noChangeAspect="1"/>
+            <a:picLocks noChangeAspect="1" noChangeArrowheads="1"/>
           </p:cNvPicPr>
           <p:nvPr/>
         </p:nvPicPr>
         <p:blipFill>
-          <a:blip r:embed="rId4">
+          <a:blip r:embed="rId2">
             <a:extLst>
               <a:ext uri="{28A0092B-C50C-407E-A947-70E740481C1C}">
                 <a14:useLocalDpi xmlns:a14="http://schemas.microsoft.com/office/drawing/2010/main" val="0"/>
               </a:ext>
             </a:extLst>
           </a:blip>
+          <a:srcRect/>
           <a:stretch>
             <a:fillRect/>
           </a:stretch>
         </p:blipFill>
-        <p:spPr>
+        <p:spPr bwMode="auto">
           <a:xfrm>
-            <a:off x="1137601" y="1517232"/>
-            <a:ext cx="2462976" cy="2462976"/>
-          </a:xfrm>
-          <a:prstGeom prst="rect">
-            <a:avLst/>
-          </a:prstGeom>
-        </p:spPr>
-      </p:pic>
-      <p:sp>
-        <p:nvSpPr>
-          <p:cNvPr id="12" name="TextBox 11">
-            <a:extLst>
-              <a:ext uri="{FF2B5EF4-FFF2-40B4-BE49-F238E27FC236}">
-                <a16:creationId xmlns:a16="http://schemas.microsoft.com/office/drawing/2014/main" id="{85971E54-AD77-44C6-B148-6B5A1E057996}"/>
-              </a:ext>
-            </a:extLst>
-          </p:cNvPr>
-          <p:cNvSpPr txBox="1"/>
-          <p:nvPr/>
-        </p:nvSpPr>
-        <p:spPr>
-          <a:xfrm>
-            <a:off x="864973" y="3980208"/>
-            <a:ext cx="3546389" cy="627864"/>
+            <a:off x="6529097" y="293365"/>
+            <a:ext cx="5330139" cy="3997604"/>
           </a:xfrm>
           <a:prstGeom prst="rect">
             <a:avLst/>
           </a:prstGeom>
           <a:noFill/>
+          <a:extLst>
+            <a:ext uri="{909E8E84-426E-40DD-AFC4-6F175D3DCCD1}">
+              <a14:hiddenFill xmlns:a14="http://schemas.microsoft.com/office/drawing/2010/main">
+                <a:solidFill>
+                  <a:srgbClr val="FFFFFF"/>
+                </a:solidFill>
+              </a14:hiddenFill>
+            </a:ext>
+          </a:extLst>
         </p:spPr>
-        <p:txBody>
-          <a:bodyPr wrap="square" lIns="182880" tIns="146304" rIns="182880" bIns="146304" rtlCol="0">
-            <a:spAutoFit/>
-          </a:bodyPr>
-          <a:lstStyle/>
-          <a:p>
-            <a:pPr>
-              <a:lnSpc>
-                <a:spcPct val="90000"/>
-              </a:lnSpc>
-              <a:spcAft>
-                <a:spcPts val="600"/>
-              </a:spcAft>
-            </a:pPr>
-            <a:r>
-              <a:rPr lang="en-CA" sz="2400" b="1" dirty="0">
-                <a:solidFill>
-                  <a:schemeClr val="bg1"/>
-                </a:solidFill>
-              </a:rPr>
-              <a:t>Carl-Hugo Marcotte</a:t>
-            </a:r>
-            <a:endParaRPr lang="en-US" sz="2400" b="1" dirty="0" err="1">
-              <a:solidFill>
-                <a:schemeClr val="bg1"/>
-              </a:solidFill>
-            </a:endParaRPr>
-          </a:p>
-        </p:txBody>
-      </p:sp>
-      <p:sp>
-        <p:nvSpPr>
-          <p:cNvPr id="13" name="TextBox 12">
+      </p:pic>
+      <p:pic>
+        <p:nvPicPr>
+          <p:cNvPr id="1028" name="Picture 4" descr="https://lh3.googleusercontent.com/ysql-HDtaZYsXX48TXavonK4X01hwPXLbkSlSQZ4LdgN6o1sTHbl6NW0A9hKPN_bHV9NnKAcGnFTLBmCiiNv0NanEXNVhruCBVe-84519ZRhBL9BpfVVZBnoHzpCdr6wRXWWvthJfRDomELs_2bkPv3FhRpx8H4y7VPckTPtcli-sin2LuXcj2xNH5F--bJKgnEXOMdejLzEwoPR0hfU4Y5QD82mh3i8aXjsI0K4Nd1LXxIScgI5C3ADM15ctBxX13kvOJVS2yuchs3ynta61UKU4XomK6-Omw94QVKNHI_7gKMu3EH0ndTIo9uVycERPUofp-L46qGTOZHLAmDWg4Tune_-2iPUi9Yo1gxmcX5u4Ql97GhfuZfaA0-Yd84v1HvQ7BarukAznxG9ecTwxBlHar0OKQ4fc4nnNU0dpz97HZMtOob4xrQ3jiykb55j5gxE7IC-XuGXgBIXuhLgRJ8oNbNUpN-9ZWTP40NdCzhaLJzoTRcwxZN2Jhw0x7Fof34TwpEMMEn071AjleByCOiJlHxL1mCLtTgxj2qj-rXV6uZye0GwNQMqGjBCAdUe7VYafc-pM07DxLHTxtHCXrKhVg43G_mrrdNe2jclthbCve2lQjPfu2SUKOwXBXjEsw3KY_rsvkCRv4GF5eG7gt38tzp_dAMq=w980-h735-no">
             <a:extLst>
               <a:ext uri="{FF2B5EF4-FFF2-40B4-BE49-F238E27FC236}">
-                <a16:creationId xmlns:a16="http://schemas.microsoft.com/office/drawing/2014/main" id="{89F31CCD-2949-408C-B72D-47E1F1F8FA71}"/>
+                <a16:creationId xmlns:a16="http://schemas.microsoft.com/office/drawing/2014/main" id="{3242B001-AAF1-41C4-B765-49D2255BC67F}"/>
               </a:ext>
             </a:extLst>
           </p:cNvPr>
-          <p:cNvSpPr txBox="1"/>
+          <p:cNvPicPr>
+            <a:picLocks noChangeAspect="1" noChangeArrowheads="1"/>
+          </p:cNvPicPr>
           <p:nvPr/>
-        </p:nvSpPr>
-        <p:spPr>
+        </p:nvPicPr>
+        <p:blipFill>
+          <a:blip r:embed="rId3">
+            <a:extLst>
+              <a:ext uri="{28A0092B-C50C-407E-A947-70E740481C1C}">
+                <a14:useLocalDpi xmlns:a14="http://schemas.microsoft.com/office/drawing/2010/main" val="0"/>
+              </a:ext>
+            </a:extLst>
+          </a:blip>
+          <a:srcRect/>
+          <a:stretch>
+            <a:fillRect/>
+          </a:stretch>
+        </p:blipFill>
+        <p:spPr bwMode="auto">
           <a:xfrm>
-            <a:off x="864972" y="4617493"/>
-            <a:ext cx="5762368" cy="1446550"/>
+            <a:off x="746619" y="2147582"/>
+            <a:ext cx="5575881" cy="4181911"/>
           </a:xfrm>
           <a:prstGeom prst="rect">
             <a:avLst/>
           </a:prstGeom>
           <a:noFill/>
-        </p:spPr>
-        <p:txBody>
-          <a:bodyPr wrap="square" lIns="182880" tIns="146304" rIns="182880" bIns="146304" rtlCol="0">
-            <a:spAutoFit/>
-          </a:bodyPr>
-          <a:lstStyle/>
-          <a:p>
-            <a:pPr>
-              <a:lnSpc>
-                <a:spcPct val="90000"/>
-              </a:lnSpc>
-              <a:spcAft>
-                <a:spcPts val="600"/>
-              </a:spcAft>
-            </a:pPr>
-            <a:r>
-              <a:rPr lang="en-CA" sz="2400" dirty="0">
+          <a:extLst>
+            <a:ext uri="{909E8E84-426E-40DD-AFC4-6F175D3DCCD1}">
+              <a14:hiddenFill xmlns:a14="http://schemas.microsoft.com/office/drawing/2010/main">
                 <a:solidFill>
-                  <a:schemeClr val="bg1"/>
+                  <a:srgbClr val="FFFFFF"/>
                 </a:solidFill>
-              </a:rPr>
-              <a:t>Twitter: </a:t>
-            </a:r>
-            <a:r>
-              <a:rPr lang="en-CA" sz="2400" dirty="0" err="1">
-                <a:solidFill>
-                  <a:schemeClr val="bg1"/>
-                </a:solidFill>
-                <a:hlinkClick r:id="rId5"/>
-              </a:rPr>
-              <a:t>CarlHugoM</a:t>
-            </a:r>
-            <a:endParaRPr lang="en-CA" sz="2400" dirty="0">
-              <a:solidFill>
-                <a:schemeClr val="bg1"/>
-              </a:solidFill>
-            </a:endParaRPr>
-          </a:p>
-          <a:p>
-            <a:pPr>
-              <a:lnSpc>
-                <a:spcPct val="90000"/>
-              </a:lnSpc>
-              <a:spcAft>
-                <a:spcPts val="600"/>
-              </a:spcAft>
-            </a:pPr>
-            <a:r>
-              <a:rPr lang="en-CA" sz="2400" dirty="0">
-                <a:solidFill>
-                  <a:schemeClr val="bg1"/>
-                </a:solidFill>
-              </a:rPr>
-              <a:t>Blog: </a:t>
-            </a:r>
-            <a:r>
-              <a:rPr lang="en-US" sz="2400" dirty="0">
-                <a:hlinkClick r:id="rId6"/>
-              </a:rPr>
-              <a:t>https://www.forevolve.com/</a:t>
-            </a:r>
-            <a:endParaRPr lang="en-US" sz="2400" dirty="0"/>
-          </a:p>
-          <a:p>
-            <a:pPr>
-              <a:lnSpc>
-                <a:spcPct val="90000"/>
-              </a:lnSpc>
-              <a:spcAft>
-                <a:spcPts val="600"/>
-              </a:spcAft>
-            </a:pPr>
-            <a:r>
-              <a:rPr lang="en-US" sz="2400" dirty="0">
-                <a:solidFill>
-                  <a:schemeClr val="bg1"/>
-                </a:solidFill>
-              </a:rPr>
-              <a:t>Other: </a:t>
-            </a:r>
-            <a:r>
-              <a:rPr lang="en-US" sz="2400" dirty="0">
-                <a:hlinkClick r:id="rId7"/>
-              </a:rPr>
-              <a:t>https://github.com/Carl-Hugo</a:t>
-            </a:r>
-            <a:endParaRPr lang="en-CA" sz="2400" dirty="0">
-              <a:solidFill>
-                <a:schemeClr val="bg1"/>
-              </a:solidFill>
-            </a:endParaRPr>
-          </a:p>
-        </p:txBody>
-      </p:sp>
-      <p:pic>
-        <p:nvPicPr>
-          <p:cNvPr id="14" name="Picture 13">
-            <a:extLst>
-              <a:ext uri="{FF2B5EF4-FFF2-40B4-BE49-F238E27FC236}">
-                <a16:creationId xmlns:a16="http://schemas.microsoft.com/office/drawing/2014/main" id="{BBDA2106-596F-47CD-A5B0-7B7626A220FC}"/>
-              </a:ext>
-            </a:extLst>
-          </p:cNvPr>
-          <p:cNvPicPr>
-            <a:picLocks noChangeAspect="1"/>
-          </p:cNvPicPr>
-          <p:nvPr/>
-        </p:nvPicPr>
-        <p:blipFill>
-          <a:blip r:embed="rId8">
-            <a:extLst>
-              <a:ext uri="{28A0092B-C50C-407E-A947-70E740481C1C}">
-                <a14:useLocalDpi xmlns:a14="http://schemas.microsoft.com/office/drawing/2010/main" val="0"/>
-              </a:ext>
-              <a:ext uri="{837473B0-CC2E-450A-ABE3-18F120FF3D39}">
-                <a1611:picAttrSrcUrl xmlns:a1611="http://schemas.microsoft.com/office/drawing/2016/11/main" r:id="rId2"/>
-              </a:ext>
-            </a:extLst>
-          </a:blip>
-          <a:stretch>
-            <a:fillRect/>
-          </a:stretch>
-        </p:blipFill>
-        <p:spPr>
-          <a:xfrm>
-            <a:off x="6830589" y="1517232"/>
-            <a:ext cx="2601735" cy="2462976"/>
-          </a:xfrm>
-          <a:prstGeom prst="rect">
-            <a:avLst/>
-          </a:prstGeom>
+              </a14:hiddenFill>
+            </a:ext>
+          </a:extLst>
         </p:spPr>
       </p:pic>
-      <p:sp>
-        <p:nvSpPr>
-          <p:cNvPr id="15" name="TextBox 14">
-            <a:extLst>
-              <a:ext uri="{FF2B5EF4-FFF2-40B4-BE49-F238E27FC236}">
-                <a16:creationId xmlns:a16="http://schemas.microsoft.com/office/drawing/2014/main" id="{85D7B070-0B80-4B92-81B9-E115FB94A0F2}"/>
-              </a:ext>
-            </a:extLst>
-          </p:cNvPr>
-          <p:cNvSpPr txBox="1"/>
-          <p:nvPr/>
-        </p:nvSpPr>
-        <p:spPr>
-          <a:xfrm>
-            <a:off x="6627340" y="3980208"/>
-            <a:ext cx="3546389" cy="627864"/>
-          </a:xfrm>
-          <a:prstGeom prst="rect">
-            <a:avLst/>
-          </a:prstGeom>
-          <a:noFill/>
-        </p:spPr>
-        <p:txBody>
-          <a:bodyPr wrap="square" lIns="182880" tIns="146304" rIns="182880" bIns="146304" rtlCol="0">
-            <a:spAutoFit/>
-          </a:bodyPr>
-          <a:lstStyle/>
-          <a:p>
-            <a:pPr>
-              <a:lnSpc>
-                <a:spcPct val="90000"/>
-              </a:lnSpc>
-              <a:spcAft>
-                <a:spcPts val="600"/>
-              </a:spcAft>
-            </a:pPr>
-            <a:r>
-              <a:rPr lang="en-CA" sz="2400" b="1" dirty="0">
-                <a:solidFill>
-                  <a:schemeClr val="bg1"/>
-                </a:solidFill>
-              </a:rPr>
-              <a:t>John Doe</a:t>
-            </a:r>
-            <a:endParaRPr lang="en-US" sz="2400" b="1" dirty="0" err="1">
-              <a:solidFill>
-                <a:schemeClr val="bg1"/>
-              </a:solidFill>
-            </a:endParaRPr>
-          </a:p>
-        </p:txBody>
-      </p:sp>
-      <p:sp>
-        <p:nvSpPr>
-          <p:cNvPr id="16" name="TextBox 15">
-            <a:extLst>
-              <a:ext uri="{FF2B5EF4-FFF2-40B4-BE49-F238E27FC236}">
-                <a16:creationId xmlns:a16="http://schemas.microsoft.com/office/drawing/2014/main" id="{ED9169BA-311E-4F62-B0D5-3CA1ABA7C549}"/>
-              </a:ext>
-            </a:extLst>
-          </p:cNvPr>
-          <p:cNvSpPr txBox="1"/>
-          <p:nvPr/>
-        </p:nvSpPr>
-        <p:spPr>
-          <a:xfrm>
-            <a:off x="6627340" y="4617493"/>
-            <a:ext cx="3343140" cy="1446550"/>
-          </a:xfrm>
-          <a:prstGeom prst="rect">
-            <a:avLst/>
-          </a:prstGeom>
-          <a:noFill/>
-        </p:spPr>
-        <p:txBody>
-          <a:bodyPr wrap="square" lIns="182880" tIns="146304" rIns="182880" bIns="146304" rtlCol="0">
-            <a:spAutoFit/>
-          </a:bodyPr>
-          <a:lstStyle/>
-          <a:p>
-            <a:pPr>
-              <a:lnSpc>
-                <a:spcPct val="90000"/>
-              </a:lnSpc>
-              <a:spcAft>
-                <a:spcPts val="600"/>
-              </a:spcAft>
-            </a:pPr>
-            <a:r>
-              <a:rPr lang="en-CA" sz="2400" dirty="0">
-                <a:solidFill>
-                  <a:schemeClr val="bg1"/>
-                </a:solidFill>
-              </a:rPr>
-              <a:t>Twitter:</a:t>
-            </a:r>
-          </a:p>
-          <a:p>
-            <a:pPr>
-              <a:lnSpc>
-                <a:spcPct val="90000"/>
-              </a:lnSpc>
-              <a:spcAft>
-                <a:spcPts val="600"/>
-              </a:spcAft>
-            </a:pPr>
-            <a:r>
-              <a:rPr lang="en-CA" sz="2400" dirty="0">
-                <a:solidFill>
-                  <a:schemeClr val="bg1"/>
-                </a:solidFill>
-              </a:rPr>
-              <a:t>Blog: </a:t>
-            </a:r>
-          </a:p>
-          <a:p>
-            <a:pPr>
-              <a:lnSpc>
-                <a:spcPct val="90000"/>
-              </a:lnSpc>
-              <a:spcAft>
-                <a:spcPts val="600"/>
-              </a:spcAft>
-            </a:pPr>
-            <a:r>
-              <a:rPr lang="en-CA" sz="2400" dirty="0">
-                <a:solidFill>
-                  <a:schemeClr val="bg1"/>
-                </a:solidFill>
-              </a:rPr>
-              <a:t>Other:</a:t>
-            </a:r>
-            <a:endParaRPr lang="en-US" sz="2400" dirty="0" err="1">
-              <a:solidFill>
-                <a:schemeClr val="bg1"/>
-              </a:solidFill>
-            </a:endParaRPr>
-          </a:p>
-        </p:txBody>
-      </p:sp>
     </p:spTree>
     <p:extLst>
       <p:ext uri="{BB962C8B-B14F-4D97-AF65-F5344CB8AC3E}">
-        <p14:creationId xmlns:p14="http://schemas.microsoft.com/office/powerpoint/2010/main" val="1264934386"/>
+        <p14:creationId xmlns:p14="http://schemas.microsoft.com/office/powerpoint/2010/main" val="3616890338"/>
       </p:ext>
     </p:extLst>
   </p:cSld>

</xml_diff>